<commit_message>
modified the mock views
</commit_message>
<xml_diff>
--- a/documentation/Mockups/powerpoint-pdf-mocks/mock-views.pptx
+++ b/documentation/Mockups/powerpoint-pdf-mocks/mock-views.pptx
@@ -272,7 +272,7 @@
           <a:p>
             <a:fld id="{D8CF119D-88CE-43A9-A1CB-35AB162FA1F6}" type="datetimeFigureOut">
               <a:rPr lang="en-US" smtClean="0"/>
-              <a:t>9/12/2019</a:t>
+              <a:t>9/13/2019</a:t>
             </a:fld>
             <a:endParaRPr lang="en-US"/>
           </a:p>
@@ -470,7 +470,7 @@
           <a:p>
             <a:fld id="{D8CF119D-88CE-43A9-A1CB-35AB162FA1F6}" type="datetimeFigureOut">
               <a:rPr lang="en-US" smtClean="0"/>
-              <a:t>9/12/2019</a:t>
+              <a:t>9/13/2019</a:t>
             </a:fld>
             <a:endParaRPr lang="en-US"/>
           </a:p>
@@ -678,7 +678,7 @@
           <a:p>
             <a:fld id="{D8CF119D-88CE-43A9-A1CB-35AB162FA1F6}" type="datetimeFigureOut">
               <a:rPr lang="en-US" smtClean="0"/>
-              <a:t>9/12/2019</a:t>
+              <a:t>9/13/2019</a:t>
             </a:fld>
             <a:endParaRPr lang="en-US"/>
           </a:p>
@@ -876,7 +876,7 @@
           <a:p>
             <a:fld id="{D8CF119D-88CE-43A9-A1CB-35AB162FA1F6}" type="datetimeFigureOut">
               <a:rPr lang="en-US" smtClean="0"/>
-              <a:t>9/12/2019</a:t>
+              <a:t>9/13/2019</a:t>
             </a:fld>
             <a:endParaRPr lang="en-US"/>
           </a:p>
@@ -1151,7 +1151,7 @@
           <a:p>
             <a:fld id="{D8CF119D-88CE-43A9-A1CB-35AB162FA1F6}" type="datetimeFigureOut">
               <a:rPr lang="en-US" smtClean="0"/>
-              <a:t>9/12/2019</a:t>
+              <a:t>9/13/2019</a:t>
             </a:fld>
             <a:endParaRPr lang="en-US"/>
           </a:p>
@@ -1416,7 +1416,7 @@
           <a:p>
             <a:fld id="{D8CF119D-88CE-43A9-A1CB-35AB162FA1F6}" type="datetimeFigureOut">
               <a:rPr lang="en-US" smtClean="0"/>
-              <a:t>9/12/2019</a:t>
+              <a:t>9/13/2019</a:t>
             </a:fld>
             <a:endParaRPr lang="en-US"/>
           </a:p>
@@ -1828,7 +1828,7 @@
           <a:p>
             <a:fld id="{D8CF119D-88CE-43A9-A1CB-35AB162FA1F6}" type="datetimeFigureOut">
               <a:rPr lang="en-US" smtClean="0"/>
-              <a:t>9/12/2019</a:t>
+              <a:t>9/13/2019</a:t>
             </a:fld>
             <a:endParaRPr lang="en-US"/>
           </a:p>
@@ -1969,7 +1969,7 @@
           <a:p>
             <a:fld id="{D8CF119D-88CE-43A9-A1CB-35AB162FA1F6}" type="datetimeFigureOut">
               <a:rPr lang="en-US" smtClean="0"/>
-              <a:t>9/12/2019</a:t>
+              <a:t>9/13/2019</a:t>
             </a:fld>
             <a:endParaRPr lang="en-US"/>
           </a:p>
@@ -2082,7 +2082,7 @@
           <a:p>
             <a:fld id="{D8CF119D-88CE-43A9-A1CB-35AB162FA1F6}" type="datetimeFigureOut">
               <a:rPr lang="en-US" smtClean="0"/>
-              <a:t>9/12/2019</a:t>
+              <a:t>9/13/2019</a:t>
             </a:fld>
             <a:endParaRPr lang="en-US"/>
           </a:p>
@@ -2393,7 +2393,7 @@
           <a:p>
             <a:fld id="{D8CF119D-88CE-43A9-A1CB-35AB162FA1F6}" type="datetimeFigureOut">
               <a:rPr lang="en-US" smtClean="0"/>
-              <a:t>9/12/2019</a:t>
+              <a:t>9/13/2019</a:t>
             </a:fld>
             <a:endParaRPr lang="en-US"/>
           </a:p>
@@ -2681,7 +2681,7 @@
           <a:p>
             <a:fld id="{D8CF119D-88CE-43A9-A1CB-35AB162FA1F6}" type="datetimeFigureOut">
               <a:rPr lang="en-US" smtClean="0"/>
-              <a:t>9/12/2019</a:t>
+              <a:t>9/13/2019</a:t>
             </a:fld>
             <a:endParaRPr lang="en-US"/>
           </a:p>
@@ -2922,7 +2922,7 @@
           <a:p>
             <a:fld id="{D8CF119D-88CE-43A9-A1CB-35AB162FA1F6}" type="datetimeFigureOut">
               <a:rPr lang="en-US" smtClean="0"/>
-              <a:t>9/12/2019</a:t>
+              <a:t>9/13/2019</a:t>
             </a:fld>
             <a:endParaRPr lang="en-US"/>
           </a:p>
@@ -3347,683 +3347,6 @@
           <a:chExt cx="0" cy="0"/>
         </a:xfrm>
       </p:grpSpPr>
-      <p:sp>
-        <p:nvSpPr>
-          <p:cNvPr id="4" name="Rectangle 3">
-            <a:extLst>
-              <a:ext uri="{FF2B5EF4-FFF2-40B4-BE49-F238E27FC236}">
-                <a16:creationId xmlns:a16="http://schemas.microsoft.com/office/drawing/2014/main" id="{BEB1926F-B812-4182-AC39-96C1A336EE5A}"/>
-              </a:ext>
-            </a:extLst>
-          </p:cNvPr>
-          <p:cNvSpPr/>
-          <p:nvPr/>
-        </p:nvSpPr>
-        <p:spPr>
-          <a:xfrm>
-            <a:off x="0" y="-5518"/>
-            <a:ext cx="12192000" cy="638665"/>
-          </a:xfrm>
-          <a:prstGeom prst="rect">
-            <a:avLst/>
-          </a:prstGeom>
-          <a:solidFill>
-            <a:srgbClr val="192857"/>
-          </a:solidFill>
-        </p:spPr>
-        <p:style>
-          <a:lnRef idx="2">
-            <a:schemeClr val="accent1">
-              <a:shade val="50000"/>
-            </a:schemeClr>
-          </a:lnRef>
-          <a:fillRef idx="1">
-            <a:schemeClr val="accent1"/>
-          </a:fillRef>
-          <a:effectRef idx="0">
-            <a:schemeClr val="accent1"/>
-          </a:effectRef>
-          <a:fontRef idx="minor">
-            <a:schemeClr val="lt1"/>
-          </a:fontRef>
-        </p:style>
-        <p:txBody>
-          <a:bodyPr rtlCol="0" anchor="ctr"/>
-          <a:lstStyle/>
-          <a:p>
-            <a:pPr algn="ctr"/>
-            <a:endParaRPr lang="en-US"/>
-          </a:p>
-        </p:txBody>
-      </p:sp>
-      <p:grpSp>
-        <p:nvGrpSpPr>
-          <p:cNvPr id="14" name="Group 13">
-            <a:extLst>
-              <a:ext uri="{FF2B5EF4-FFF2-40B4-BE49-F238E27FC236}">
-                <a16:creationId xmlns:a16="http://schemas.microsoft.com/office/drawing/2014/main" id="{D3EFAE7F-8139-440D-A9CA-B37C6E346EE3}"/>
-              </a:ext>
-            </a:extLst>
-          </p:cNvPr>
-          <p:cNvGrpSpPr/>
-          <p:nvPr/>
-        </p:nvGrpSpPr>
-        <p:grpSpPr>
-          <a:xfrm>
-            <a:off x="2023927" y="97421"/>
-            <a:ext cx="3028757" cy="378073"/>
-            <a:chOff x="3427615" y="123834"/>
-            <a:chExt cx="2668385" cy="378073"/>
-          </a:xfrm>
-        </p:grpSpPr>
-        <p:sp>
-          <p:nvSpPr>
-            <p:cNvPr id="12" name="Rectangle: Rounded Corners 11">
-              <a:extLst>
-                <a:ext uri="{FF2B5EF4-FFF2-40B4-BE49-F238E27FC236}">
-                  <a16:creationId xmlns:a16="http://schemas.microsoft.com/office/drawing/2014/main" id="{AF305521-C515-46EA-9D38-C183EF77F5AF}"/>
-                </a:ext>
-              </a:extLst>
-            </p:cNvPr>
-            <p:cNvSpPr/>
-            <p:nvPr/>
-          </p:nvSpPr>
-          <p:spPr>
-            <a:xfrm>
-              <a:off x="3427615" y="132575"/>
-              <a:ext cx="2668385" cy="369332"/>
-            </a:xfrm>
-            <a:prstGeom prst="roundRect">
-              <a:avLst/>
-            </a:prstGeom>
-            <a:solidFill>
-              <a:srgbClr val="F2F2F2"/>
-            </a:solidFill>
-          </p:spPr>
-          <p:style>
-            <a:lnRef idx="2">
-              <a:schemeClr val="accent1">
-                <a:shade val="50000"/>
-              </a:schemeClr>
-            </a:lnRef>
-            <a:fillRef idx="1">
-              <a:schemeClr val="accent1"/>
-            </a:fillRef>
-            <a:effectRef idx="0">
-              <a:schemeClr val="accent1"/>
-            </a:effectRef>
-            <a:fontRef idx="minor">
-              <a:schemeClr val="lt1"/>
-            </a:fontRef>
-          </p:style>
-          <p:txBody>
-            <a:bodyPr rtlCol="0" anchor="ctr"/>
-            <a:lstStyle/>
-            <a:p>
-              <a:pPr algn="ctr"/>
-              <a:endParaRPr lang="en-US"/>
-            </a:p>
-          </p:txBody>
-        </p:sp>
-        <p:sp>
-          <p:nvSpPr>
-            <p:cNvPr id="13" name="TextBox 12">
-              <a:extLst>
-                <a:ext uri="{FF2B5EF4-FFF2-40B4-BE49-F238E27FC236}">
-                  <a16:creationId xmlns:a16="http://schemas.microsoft.com/office/drawing/2014/main" id="{B3E0795B-80DE-4C4D-B46F-C72B3A55C35E}"/>
-                </a:ext>
-              </a:extLst>
-            </p:cNvPr>
-            <p:cNvSpPr txBox="1"/>
-            <p:nvPr/>
-          </p:nvSpPr>
-          <p:spPr>
-            <a:xfrm>
-              <a:off x="3427615" y="123834"/>
-              <a:ext cx="2402378" cy="369332"/>
-            </a:xfrm>
-            <a:prstGeom prst="rect">
-              <a:avLst/>
-            </a:prstGeom>
-            <a:noFill/>
-          </p:spPr>
-          <p:txBody>
-            <a:bodyPr wrap="square" rtlCol="0">
-              <a:spAutoFit/>
-            </a:bodyPr>
-            <a:lstStyle/>
-            <a:p>
-              <a:r>
-                <a:rPr lang="en-US" dirty="0">
-                  <a:solidFill>
-                    <a:schemeClr val="bg2">
-                      <a:lumMod val="50000"/>
-                    </a:schemeClr>
-                  </a:solidFill>
-                </a:rPr>
-                <a:t>Quick Search…</a:t>
-              </a:r>
-            </a:p>
-          </p:txBody>
-        </p:sp>
-      </p:grpSp>
-      <p:grpSp>
-        <p:nvGrpSpPr>
-          <p:cNvPr id="24" name="Group 23">
-            <a:extLst>
-              <a:ext uri="{FF2B5EF4-FFF2-40B4-BE49-F238E27FC236}">
-                <a16:creationId xmlns:a16="http://schemas.microsoft.com/office/drawing/2014/main" id="{A866E011-8CFD-4529-9067-9AE9A954C117}"/>
-              </a:ext>
-            </a:extLst>
-          </p:cNvPr>
-          <p:cNvGrpSpPr/>
-          <p:nvPr/>
-        </p:nvGrpSpPr>
-        <p:grpSpPr>
-          <a:xfrm>
-            <a:off x="5204451" y="125253"/>
-            <a:ext cx="365760" cy="299258"/>
-            <a:chOff x="623455" y="856211"/>
-            <a:chExt cx="498763" cy="415636"/>
-          </a:xfrm>
-        </p:grpSpPr>
-        <p:sp>
-          <p:nvSpPr>
-            <p:cNvPr id="15" name="Rectangle: Rounded Corners 14">
-              <a:extLst>
-                <a:ext uri="{FF2B5EF4-FFF2-40B4-BE49-F238E27FC236}">
-                  <a16:creationId xmlns:a16="http://schemas.microsoft.com/office/drawing/2014/main" id="{E3CE49D6-69C2-415F-871F-03C79060A46C}"/>
-                </a:ext>
-              </a:extLst>
-            </p:cNvPr>
-            <p:cNvSpPr/>
-            <p:nvPr/>
-          </p:nvSpPr>
-          <p:spPr>
-            <a:xfrm>
-              <a:off x="623455" y="856211"/>
-              <a:ext cx="498763" cy="415636"/>
-            </a:xfrm>
-            <a:prstGeom prst="roundRect">
-              <a:avLst/>
-            </a:prstGeom>
-            <a:solidFill>
-              <a:srgbClr val="BFA458"/>
-            </a:solidFill>
-          </p:spPr>
-          <p:style>
-            <a:lnRef idx="2">
-              <a:schemeClr val="accent1">
-                <a:shade val="50000"/>
-              </a:schemeClr>
-            </a:lnRef>
-            <a:fillRef idx="1">
-              <a:schemeClr val="accent1"/>
-            </a:fillRef>
-            <a:effectRef idx="0">
-              <a:schemeClr val="accent1"/>
-            </a:effectRef>
-            <a:fontRef idx="minor">
-              <a:schemeClr val="lt1"/>
-            </a:fontRef>
-          </p:style>
-          <p:txBody>
-            <a:bodyPr rtlCol="0" anchor="ctr"/>
-            <a:lstStyle/>
-            <a:p>
-              <a:pPr algn="ctr"/>
-              <a:endParaRPr lang="en-US"/>
-            </a:p>
-          </p:txBody>
-        </p:sp>
-        <p:grpSp>
-          <p:nvGrpSpPr>
-            <p:cNvPr id="23" name="Group 22">
-              <a:extLst>
-                <a:ext uri="{FF2B5EF4-FFF2-40B4-BE49-F238E27FC236}">
-                  <a16:creationId xmlns:a16="http://schemas.microsoft.com/office/drawing/2014/main" id="{D29B8480-3034-4BEC-BD52-2E8E428D7E2A}"/>
-                </a:ext>
-              </a:extLst>
-            </p:cNvPr>
-            <p:cNvGrpSpPr/>
-            <p:nvPr/>
-          </p:nvGrpSpPr>
-          <p:grpSpPr>
-            <a:xfrm>
-              <a:off x="724038" y="950768"/>
-              <a:ext cx="297595" cy="226521"/>
-              <a:chOff x="999190" y="1753985"/>
-              <a:chExt cx="297595" cy="226521"/>
-            </a:xfrm>
-          </p:grpSpPr>
-          <p:sp>
-            <p:nvSpPr>
-              <p:cNvPr id="16" name="Oval 15">
-                <a:extLst>
-                  <a:ext uri="{FF2B5EF4-FFF2-40B4-BE49-F238E27FC236}">
-                    <a16:creationId xmlns:a16="http://schemas.microsoft.com/office/drawing/2014/main" id="{26AA5EC4-DB01-411B-BEB0-7A1DC3DE4D52}"/>
-                  </a:ext>
-                </a:extLst>
-              </p:cNvPr>
-              <p:cNvSpPr/>
-              <p:nvPr/>
-            </p:nvSpPr>
-            <p:spPr>
-              <a:xfrm>
-                <a:off x="1122218" y="1753985"/>
-                <a:ext cx="174567" cy="166255"/>
-              </a:xfrm>
-              <a:prstGeom prst="ellipse">
-                <a:avLst/>
-              </a:prstGeom>
-              <a:solidFill>
-                <a:schemeClr val="bg1"/>
-              </a:solidFill>
-              <a:ln>
-                <a:solidFill>
-                  <a:srgbClr val="192857"/>
-                </a:solidFill>
-              </a:ln>
-            </p:spPr>
-            <p:style>
-              <a:lnRef idx="2">
-                <a:schemeClr val="accent1">
-                  <a:shade val="50000"/>
-                </a:schemeClr>
-              </a:lnRef>
-              <a:fillRef idx="1">
-                <a:schemeClr val="accent1"/>
-              </a:fillRef>
-              <a:effectRef idx="0">
-                <a:schemeClr val="accent1"/>
-              </a:effectRef>
-              <a:fontRef idx="minor">
-                <a:schemeClr val="lt1"/>
-              </a:fontRef>
-            </p:style>
-            <p:txBody>
-              <a:bodyPr rtlCol="0" anchor="ctr"/>
-              <a:lstStyle/>
-              <a:p>
-                <a:pPr algn="ctr"/>
-                <a:endParaRPr lang="en-US" dirty="0"/>
-              </a:p>
-            </p:txBody>
-          </p:sp>
-          <p:sp>
-            <p:nvSpPr>
-              <p:cNvPr id="22" name="Rectangle 21">
-                <a:extLst>
-                  <a:ext uri="{FF2B5EF4-FFF2-40B4-BE49-F238E27FC236}">
-                    <a16:creationId xmlns:a16="http://schemas.microsoft.com/office/drawing/2014/main" id="{488E4FD0-E27B-4AC8-85D0-A56358F1DD34}"/>
-                  </a:ext>
-                </a:extLst>
-              </p:cNvPr>
-              <p:cNvSpPr/>
-              <p:nvPr/>
-            </p:nvSpPr>
-            <p:spPr>
-              <a:xfrm rot="2802451">
-                <a:off x="1063614" y="1870363"/>
-                <a:ext cx="45719" cy="174567"/>
-              </a:xfrm>
-              <a:prstGeom prst="rect">
-                <a:avLst/>
-              </a:prstGeom>
-              <a:solidFill>
-                <a:srgbClr val="192857"/>
-              </a:solidFill>
-              <a:ln>
-                <a:solidFill>
-                  <a:srgbClr val="192857"/>
-                </a:solidFill>
-              </a:ln>
-            </p:spPr>
-            <p:style>
-              <a:lnRef idx="2">
-                <a:schemeClr val="accent1">
-                  <a:shade val="50000"/>
-                </a:schemeClr>
-              </a:lnRef>
-              <a:fillRef idx="1">
-                <a:schemeClr val="accent1"/>
-              </a:fillRef>
-              <a:effectRef idx="0">
-                <a:schemeClr val="accent1"/>
-              </a:effectRef>
-              <a:fontRef idx="minor">
-                <a:schemeClr val="lt1"/>
-              </a:fontRef>
-            </p:style>
-            <p:txBody>
-              <a:bodyPr rtlCol="0" anchor="ctr"/>
-              <a:lstStyle/>
-              <a:p>
-                <a:pPr algn="ctr"/>
-                <a:endParaRPr lang="en-US"/>
-              </a:p>
-            </p:txBody>
-          </p:sp>
-        </p:grpSp>
-      </p:grpSp>
-      <p:grpSp>
-        <p:nvGrpSpPr>
-          <p:cNvPr id="32" name="Group 31">
-            <a:extLst>
-              <a:ext uri="{FF2B5EF4-FFF2-40B4-BE49-F238E27FC236}">
-                <a16:creationId xmlns:a16="http://schemas.microsoft.com/office/drawing/2014/main" id="{4D69882B-07B6-4927-9C6A-038E3187DE76}"/>
-              </a:ext>
-            </a:extLst>
-          </p:cNvPr>
-          <p:cNvGrpSpPr/>
-          <p:nvPr/>
-        </p:nvGrpSpPr>
-        <p:grpSpPr>
-          <a:xfrm>
-            <a:off x="9350027" y="0"/>
-            <a:ext cx="2163816" cy="799674"/>
-            <a:chOff x="9040573" y="-17327"/>
-            <a:chExt cx="2163816" cy="799674"/>
-          </a:xfrm>
-        </p:grpSpPr>
-        <p:sp>
-          <p:nvSpPr>
-            <p:cNvPr id="26" name="Rectangle: Rounded Corners 25">
-              <a:extLst>
-                <a:ext uri="{FF2B5EF4-FFF2-40B4-BE49-F238E27FC236}">
-                  <a16:creationId xmlns:a16="http://schemas.microsoft.com/office/drawing/2014/main" id="{65C0007B-02C5-4659-8284-301AD03D2620}"/>
-                </a:ext>
-              </a:extLst>
-            </p:cNvPr>
-            <p:cNvSpPr/>
-            <p:nvPr/>
-          </p:nvSpPr>
-          <p:spPr>
-            <a:xfrm>
-              <a:off x="9445569" y="-17327"/>
-              <a:ext cx="1758820" cy="633147"/>
-            </a:xfrm>
-            <a:prstGeom prst="roundRect">
-              <a:avLst/>
-            </a:prstGeom>
-            <a:solidFill>
-              <a:srgbClr val="192857"/>
-            </a:solidFill>
-            <a:ln w="25400">
-              <a:solidFill>
-                <a:srgbClr val="BFA458"/>
-              </a:solidFill>
-            </a:ln>
-          </p:spPr>
-          <p:style>
-            <a:lnRef idx="2">
-              <a:schemeClr val="accent1">
-                <a:shade val="50000"/>
-              </a:schemeClr>
-            </a:lnRef>
-            <a:fillRef idx="1">
-              <a:schemeClr val="accent1"/>
-            </a:fillRef>
-            <a:effectRef idx="0">
-              <a:schemeClr val="accent1"/>
-            </a:effectRef>
-            <a:fontRef idx="minor">
-              <a:schemeClr val="lt1"/>
-            </a:fontRef>
-          </p:style>
-          <p:txBody>
-            <a:bodyPr rtlCol="0" anchor="ctr"/>
-            <a:lstStyle/>
-            <a:p>
-              <a:pPr algn="ctr"/>
-              <a:endParaRPr lang="en-US" sz="1400" dirty="0">
-                <a:solidFill>
-                  <a:srgbClr val="BFA458"/>
-                </a:solidFill>
-                <a:latin typeface="Arial Black" panose="020B0A04020102020204" pitchFamily="34" charset="0"/>
-                <a:cs typeface="Aharoni" panose="02010803020104030203" pitchFamily="2" charset="-79"/>
-              </a:endParaRPr>
-            </a:p>
-          </p:txBody>
-        </p:sp>
-        <p:sp>
-          <p:nvSpPr>
-            <p:cNvPr id="28" name="TextBox 27">
-              <a:extLst>
-                <a:ext uri="{FF2B5EF4-FFF2-40B4-BE49-F238E27FC236}">
-                  <a16:creationId xmlns:a16="http://schemas.microsoft.com/office/drawing/2014/main" id="{73C1C642-37DD-4A5A-AEE1-3BB8CDC3450F}"/>
-                </a:ext>
-              </a:extLst>
-            </p:cNvPr>
-            <p:cNvSpPr txBox="1"/>
-            <p:nvPr/>
-          </p:nvSpPr>
-          <p:spPr>
-            <a:xfrm>
-              <a:off x="9040573" y="43683"/>
-              <a:ext cx="1998300" cy="738664"/>
-            </a:xfrm>
-            <a:prstGeom prst="rect">
-              <a:avLst/>
-            </a:prstGeom>
-            <a:noFill/>
-          </p:spPr>
-          <p:txBody>
-            <a:bodyPr wrap="square" rtlCol="0">
-              <a:spAutoFit/>
-            </a:bodyPr>
-            <a:lstStyle/>
-            <a:p>
-              <a:pPr algn="ctr"/>
-              <a:r>
-                <a:rPr lang="en-US" sz="1400" dirty="0">
-                  <a:solidFill>
-                    <a:srgbClr val="BFA458"/>
-                  </a:solidFill>
-                  <a:latin typeface="Arial Black" panose="020B0A04020102020204" pitchFamily="34" charset="0"/>
-                  <a:cs typeface="Aharoni" panose="02010803020104030203" pitchFamily="2" charset="-79"/>
-                </a:rPr>
-                <a:t>User1234</a:t>
-              </a:r>
-            </a:p>
-            <a:p>
-              <a:pPr algn="ctr"/>
-              <a:r>
-                <a:rPr lang="en-US" sz="1400" dirty="0">
-                  <a:solidFill>
-                    <a:srgbClr val="BFA458"/>
-                  </a:solidFill>
-                  <a:latin typeface="Arial Black" panose="020B0A04020102020204" pitchFamily="34" charset="0"/>
-                  <a:cs typeface="Aharoni" panose="02010803020104030203" pitchFamily="2" charset="-79"/>
-                </a:rPr>
-                <a:t>Profile</a:t>
-              </a:r>
-            </a:p>
-            <a:p>
-              <a:endParaRPr lang="en-US" sz="1400" dirty="0"/>
-            </a:p>
-          </p:txBody>
-        </p:sp>
-        <p:sp>
-          <p:nvSpPr>
-            <p:cNvPr id="29" name="Isosceles Triangle 28">
-              <a:extLst>
-                <a:ext uri="{FF2B5EF4-FFF2-40B4-BE49-F238E27FC236}">
-                  <a16:creationId xmlns:a16="http://schemas.microsoft.com/office/drawing/2014/main" id="{9CE344C2-A5FE-4F70-9A3D-364BCFCA1D71}"/>
-                </a:ext>
-              </a:extLst>
-            </p:cNvPr>
-            <p:cNvSpPr/>
-            <p:nvPr/>
-          </p:nvSpPr>
-          <p:spPr>
-            <a:xfrm rot="10800000">
-              <a:off x="10674980" y="173952"/>
-              <a:ext cx="363893" cy="251926"/>
-            </a:xfrm>
-            <a:prstGeom prst="triangle">
-              <a:avLst/>
-            </a:prstGeom>
-            <a:solidFill>
-              <a:srgbClr val="BFA458"/>
-            </a:solidFill>
-            <a:ln w="12700">
-              <a:solidFill>
-                <a:schemeClr val="bg1"/>
-              </a:solidFill>
-            </a:ln>
-          </p:spPr>
-          <p:style>
-            <a:lnRef idx="2">
-              <a:schemeClr val="accent1">
-                <a:shade val="50000"/>
-              </a:schemeClr>
-            </a:lnRef>
-            <a:fillRef idx="1">
-              <a:schemeClr val="accent1"/>
-            </a:fillRef>
-            <a:effectRef idx="0">
-              <a:schemeClr val="accent1"/>
-            </a:effectRef>
-            <a:fontRef idx="minor">
-              <a:schemeClr val="lt1"/>
-            </a:fontRef>
-          </p:style>
-          <p:txBody>
-            <a:bodyPr rtlCol="0" anchor="ctr"/>
-            <a:lstStyle/>
-            <a:p>
-              <a:pPr algn="ctr"/>
-              <a:endParaRPr lang="en-US"/>
-            </a:p>
-          </p:txBody>
-        </p:sp>
-      </p:grpSp>
-      <p:sp>
-        <p:nvSpPr>
-          <p:cNvPr id="35" name="Rectangle: Rounded Corners 34">
-            <a:extLst>
-              <a:ext uri="{FF2B5EF4-FFF2-40B4-BE49-F238E27FC236}">
-                <a16:creationId xmlns:a16="http://schemas.microsoft.com/office/drawing/2014/main" id="{0E4E93C0-9487-4BC8-9A6A-1D6F8291A21C}"/>
-              </a:ext>
-            </a:extLst>
-          </p:cNvPr>
-          <p:cNvSpPr/>
-          <p:nvPr/>
-        </p:nvSpPr>
-        <p:spPr>
-          <a:xfrm>
-            <a:off x="5846450" y="-9699"/>
-            <a:ext cx="1758820" cy="633147"/>
-          </a:xfrm>
-          <a:prstGeom prst="roundRect">
-            <a:avLst/>
-          </a:prstGeom>
-          <a:solidFill>
-            <a:srgbClr val="192857"/>
-          </a:solidFill>
-          <a:ln w="25400">
-            <a:solidFill>
-              <a:srgbClr val="BFA458"/>
-            </a:solidFill>
-          </a:ln>
-        </p:spPr>
-        <p:style>
-          <a:lnRef idx="2">
-            <a:schemeClr val="accent1">
-              <a:shade val="50000"/>
-            </a:schemeClr>
-          </a:lnRef>
-          <a:fillRef idx="1">
-            <a:schemeClr val="accent1"/>
-          </a:fillRef>
-          <a:effectRef idx="0">
-            <a:schemeClr val="accent1"/>
-          </a:effectRef>
-          <a:fontRef idx="minor">
-            <a:schemeClr val="lt1"/>
-          </a:fontRef>
-        </p:style>
-        <p:txBody>
-          <a:bodyPr rtlCol="0" anchor="ctr"/>
-          <a:lstStyle/>
-          <a:p>
-            <a:pPr algn="ctr"/>
-            <a:r>
-              <a:rPr lang="en-US" sz="1400" dirty="0">
-                <a:solidFill>
-                  <a:srgbClr val="BFA458"/>
-                </a:solidFill>
-                <a:latin typeface="Arial Black" panose="020B0A04020102020204" pitchFamily="34" charset="0"/>
-                <a:cs typeface="Aharoni" panose="02010803020104030203" pitchFamily="2" charset="-79"/>
-              </a:rPr>
-              <a:t>Filter Your Search!</a:t>
-            </a:r>
-          </a:p>
-        </p:txBody>
-      </p:sp>
-      <p:sp>
-        <p:nvSpPr>
-          <p:cNvPr id="36" name="Rectangle: Rounded Corners 35">
-            <a:extLst>
-              <a:ext uri="{FF2B5EF4-FFF2-40B4-BE49-F238E27FC236}">
-                <a16:creationId xmlns:a16="http://schemas.microsoft.com/office/drawing/2014/main" id="{9340412D-FD2B-47FA-BC1D-C8E575A02665}"/>
-              </a:ext>
-            </a:extLst>
-          </p:cNvPr>
-          <p:cNvSpPr/>
-          <p:nvPr/>
-        </p:nvSpPr>
-        <p:spPr>
-          <a:xfrm>
-            <a:off x="7830687" y="0"/>
-            <a:ext cx="1758820" cy="633147"/>
-          </a:xfrm>
-          <a:prstGeom prst="roundRect">
-            <a:avLst/>
-          </a:prstGeom>
-          <a:solidFill>
-            <a:srgbClr val="192857"/>
-          </a:solidFill>
-          <a:ln w="25400">
-            <a:solidFill>
-              <a:srgbClr val="BFA458"/>
-            </a:solidFill>
-          </a:ln>
-        </p:spPr>
-        <p:style>
-          <a:lnRef idx="2">
-            <a:schemeClr val="accent1">
-              <a:shade val="50000"/>
-            </a:schemeClr>
-          </a:lnRef>
-          <a:fillRef idx="1">
-            <a:schemeClr val="accent1"/>
-          </a:fillRef>
-          <a:effectRef idx="0">
-            <a:schemeClr val="accent1"/>
-          </a:effectRef>
-          <a:fontRef idx="minor">
-            <a:schemeClr val="lt1"/>
-          </a:fontRef>
-        </p:style>
-        <p:txBody>
-          <a:bodyPr rtlCol="0" anchor="ctr"/>
-          <a:lstStyle/>
-          <a:p>
-            <a:pPr algn="ctr"/>
-            <a:r>
-              <a:rPr lang="en-US" sz="1400" dirty="0">
-                <a:solidFill>
-                  <a:srgbClr val="BFA458"/>
-                </a:solidFill>
-                <a:latin typeface="Arial Black" panose="020B0A04020102020204" pitchFamily="34" charset="0"/>
-              </a:rPr>
-              <a:t>Create a Posting!</a:t>
-            </a:r>
-          </a:p>
-        </p:txBody>
-      </p:sp>
       <p:grpSp>
         <p:nvGrpSpPr>
           <p:cNvPr id="94" name="Group 93">
@@ -4802,7 +4125,7 @@
         </p:nvGrpSpPr>
         <p:grpSpPr>
           <a:xfrm>
-            <a:off x="4372427" y="1077481"/>
+            <a:off x="4101836" y="1077481"/>
             <a:ext cx="3429415" cy="3802343"/>
             <a:chOff x="186550" y="1012244"/>
             <a:chExt cx="3429415" cy="3802343"/>
@@ -5566,7 +4889,7 @@
         </p:nvGrpSpPr>
         <p:grpSpPr>
           <a:xfrm>
-            <a:off x="8576037" y="1077482"/>
+            <a:off x="7941559" y="1077482"/>
             <a:ext cx="3429415" cy="3802343"/>
             <a:chOff x="186550" y="1012244"/>
             <a:chExt cx="3429415" cy="3802343"/>
@@ -6368,7 +5691,7 @@
         </p:blipFill>
         <p:spPr>
           <a:xfrm>
-            <a:off x="4372427" y="5201938"/>
+            <a:off x="4101836" y="5201938"/>
             <a:ext cx="3629025" cy="1666875"/>
           </a:xfrm>
           <a:prstGeom prst="rect">
@@ -6398,7 +5721,7 @@
         </p:blipFill>
         <p:spPr>
           <a:xfrm>
-            <a:off x="8564240" y="5201938"/>
+            <a:off x="7929762" y="5201938"/>
             <a:ext cx="3629025" cy="1666875"/>
           </a:xfrm>
           <a:prstGeom prst="rect">
@@ -6406,12 +5729,53 @@
           </a:prstGeom>
         </p:spPr>
       </p:pic>
+      <p:sp>
+        <p:nvSpPr>
+          <p:cNvPr id="2" name="TextBox 1">
+            <a:extLst>
+              <a:ext uri="{FF2B5EF4-FFF2-40B4-BE49-F238E27FC236}">
+                <a16:creationId xmlns:a16="http://schemas.microsoft.com/office/drawing/2014/main" id="{1291F3B4-3B52-4D14-B58E-E1A90E7F1BCF}"/>
+              </a:ext>
+            </a:extLst>
+          </p:cNvPr>
+          <p:cNvSpPr txBox="1"/>
+          <p:nvPr/>
+        </p:nvSpPr>
+        <p:spPr>
+          <a:xfrm>
+            <a:off x="8509545" y="5761628"/>
+            <a:ext cx="1081748" cy="954107"/>
+          </a:xfrm>
+          <a:prstGeom prst="rect">
+            <a:avLst/>
+          </a:prstGeom>
+          <a:solidFill>
+            <a:srgbClr val="FFFF00"/>
+          </a:solidFill>
+        </p:spPr>
+        <p:txBody>
+          <a:bodyPr wrap="square" rtlCol="0">
+            <a:spAutoFit/>
+          </a:bodyPr>
+          <a:lstStyle/>
+          <a:p>
+            <a:r>
+              <a:rPr lang="en-US" sz="2800" b="1" dirty="0">
+                <a:highlight>
+                  <a:srgbClr val="FFFF00"/>
+                </a:highlight>
+              </a:rPr>
+              <a:t>USER VIEW</a:t>
+            </a:r>
+          </a:p>
+        </p:txBody>
+      </p:sp>
       <p:grpSp>
         <p:nvGrpSpPr>
-          <p:cNvPr id="5" name="Group 4">
-            <a:extLst>
-              <a:ext uri="{FF2B5EF4-FFF2-40B4-BE49-F238E27FC236}">
-                <a16:creationId xmlns:a16="http://schemas.microsoft.com/office/drawing/2014/main" id="{3E6D053F-E439-4652-839D-841A75879F60}"/>
+          <p:cNvPr id="9" name="Group 8">
+            <a:extLst>
+              <a:ext uri="{FF2B5EF4-FFF2-40B4-BE49-F238E27FC236}">
+                <a16:creationId xmlns:a16="http://schemas.microsoft.com/office/drawing/2014/main" id="{FDFA6C1E-F0A8-42F9-B5A7-82C690899FFC}"/>
               </a:ext>
             </a:extLst>
           </p:cNvPr>
@@ -6420,12 +5784,412 @@
         </p:nvGrpSpPr>
         <p:grpSpPr>
           <a:xfrm>
-            <a:off x="355499" y="0"/>
-            <a:ext cx="1498313" cy="633147"/>
-            <a:chOff x="843672" y="540620"/>
-            <a:chExt cx="1498313" cy="633147"/>
+            <a:off x="0" y="-5519"/>
+            <a:ext cx="12192000" cy="644184"/>
+            <a:chOff x="0" y="-5519"/>
+            <a:chExt cx="12192000" cy="644184"/>
           </a:xfrm>
         </p:grpSpPr>
+        <p:sp>
+          <p:nvSpPr>
+            <p:cNvPr id="4" name="Rectangle 3">
+              <a:extLst>
+                <a:ext uri="{FF2B5EF4-FFF2-40B4-BE49-F238E27FC236}">
+                  <a16:creationId xmlns:a16="http://schemas.microsoft.com/office/drawing/2014/main" id="{BEB1926F-B812-4182-AC39-96C1A336EE5A}"/>
+                </a:ext>
+              </a:extLst>
+            </p:cNvPr>
+            <p:cNvSpPr/>
+            <p:nvPr/>
+          </p:nvSpPr>
+          <p:spPr>
+            <a:xfrm>
+              <a:off x="0" y="-5518"/>
+              <a:ext cx="12192000" cy="638665"/>
+            </a:xfrm>
+            <a:prstGeom prst="rect">
+              <a:avLst/>
+            </a:prstGeom>
+            <a:solidFill>
+              <a:srgbClr val="192857"/>
+            </a:solidFill>
+          </p:spPr>
+          <p:style>
+            <a:lnRef idx="2">
+              <a:schemeClr val="accent1">
+                <a:shade val="50000"/>
+              </a:schemeClr>
+            </a:lnRef>
+            <a:fillRef idx="1">
+              <a:schemeClr val="accent1"/>
+            </a:fillRef>
+            <a:effectRef idx="0">
+              <a:schemeClr val="accent1"/>
+            </a:effectRef>
+            <a:fontRef idx="minor">
+              <a:schemeClr val="lt1"/>
+            </a:fontRef>
+          </p:style>
+          <p:txBody>
+            <a:bodyPr rtlCol="0" anchor="ctr"/>
+            <a:lstStyle/>
+            <a:p>
+              <a:pPr algn="ctr"/>
+              <a:endParaRPr lang="en-US" dirty="0"/>
+            </a:p>
+          </p:txBody>
+        </p:sp>
+        <p:grpSp>
+          <p:nvGrpSpPr>
+            <p:cNvPr id="14" name="Group 13">
+              <a:extLst>
+                <a:ext uri="{FF2B5EF4-FFF2-40B4-BE49-F238E27FC236}">
+                  <a16:creationId xmlns:a16="http://schemas.microsoft.com/office/drawing/2014/main" id="{D3EFAE7F-8139-440D-A9CA-B37C6E346EE3}"/>
+                </a:ext>
+              </a:extLst>
+            </p:cNvPr>
+            <p:cNvGrpSpPr/>
+            <p:nvPr/>
+          </p:nvGrpSpPr>
+          <p:grpSpPr>
+            <a:xfrm>
+              <a:off x="2023927" y="97421"/>
+              <a:ext cx="3028757" cy="378073"/>
+              <a:chOff x="3427615" y="123834"/>
+              <a:chExt cx="2668385" cy="378073"/>
+            </a:xfrm>
+          </p:grpSpPr>
+          <p:sp>
+            <p:nvSpPr>
+              <p:cNvPr id="12" name="Rectangle: Rounded Corners 11">
+                <a:extLst>
+                  <a:ext uri="{FF2B5EF4-FFF2-40B4-BE49-F238E27FC236}">
+                    <a16:creationId xmlns:a16="http://schemas.microsoft.com/office/drawing/2014/main" id="{AF305521-C515-46EA-9D38-C183EF77F5AF}"/>
+                  </a:ext>
+                </a:extLst>
+              </p:cNvPr>
+              <p:cNvSpPr/>
+              <p:nvPr/>
+            </p:nvSpPr>
+            <p:spPr>
+              <a:xfrm>
+                <a:off x="3427615" y="132575"/>
+                <a:ext cx="2668385" cy="369332"/>
+              </a:xfrm>
+              <a:prstGeom prst="roundRect">
+                <a:avLst/>
+              </a:prstGeom>
+              <a:solidFill>
+                <a:srgbClr val="F2F2F2"/>
+              </a:solidFill>
+            </p:spPr>
+            <p:style>
+              <a:lnRef idx="2">
+                <a:schemeClr val="accent1">
+                  <a:shade val="50000"/>
+                </a:schemeClr>
+              </a:lnRef>
+              <a:fillRef idx="1">
+                <a:schemeClr val="accent1"/>
+              </a:fillRef>
+              <a:effectRef idx="0">
+                <a:schemeClr val="accent1"/>
+              </a:effectRef>
+              <a:fontRef idx="minor">
+                <a:schemeClr val="lt1"/>
+              </a:fontRef>
+            </p:style>
+            <p:txBody>
+              <a:bodyPr rtlCol="0" anchor="ctr"/>
+              <a:lstStyle/>
+              <a:p>
+                <a:pPr algn="ctr"/>
+                <a:endParaRPr lang="en-US"/>
+              </a:p>
+            </p:txBody>
+          </p:sp>
+          <p:sp>
+            <p:nvSpPr>
+              <p:cNvPr id="13" name="TextBox 12">
+                <a:extLst>
+                  <a:ext uri="{FF2B5EF4-FFF2-40B4-BE49-F238E27FC236}">
+                    <a16:creationId xmlns:a16="http://schemas.microsoft.com/office/drawing/2014/main" id="{B3E0795B-80DE-4C4D-B46F-C72B3A55C35E}"/>
+                  </a:ext>
+                </a:extLst>
+              </p:cNvPr>
+              <p:cNvSpPr txBox="1"/>
+              <p:nvPr/>
+            </p:nvSpPr>
+            <p:spPr>
+              <a:xfrm>
+                <a:off x="3427615" y="123834"/>
+                <a:ext cx="2402378" cy="369332"/>
+              </a:xfrm>
+              <a:prstGeom prst="rect">
+                <a:avLst/>
+              </a:prstGeom>
+              <a:noFill/>
+            </p:spPr>
+            <p:txBody>
+              <a:bodyPr wrap="square" rtlCol="0">
+                <a:spAutoFit/>
+              </a:bodyPr>
+              <a:lstStyle/>
+              <a:p>
+                <a:r>
+                  <a:rPr lang="en-US" dirty="0">
+                    <a:solidFill>
+                      <a:schemeClr val="bg2">
+                        <a:lumMod val="50000"/>
+                      </a:schemeClr>
+                    </a:solidFill>
+                  </a:rPr>
+                  <a:t>Quick Search…</a:t>
+                </a:r>
+              </a:p>
+            </p:txBody>
+          </p:sp>
+        </p:grpSp>
+        <p:grpSp>
+          <p:nvGrpSpPr>
+            <p:cNvPr id="24" name="Group 23">
+              <a:extLst>
+                <a:ext uri="{FF2B5EF4-FFF2-40B4-BE49-F238E27FC236}">
+                  <a16:creationId xmlns:a16="http://schemas.microsoft.com/office/drawing/2014/main" id="{A866E011-8CFD-4529-9067-9AE9A954C117}"/>
+                </a:ext>
+              </a:extLst>
+            </p:cNvPr>
+            <p:cNvGrpSpPr/>
+            <p:nvPr/>
+          </p:nvGrpSpPr>
+          <p:grpSpPr>
+            <a:xfrm>
+              <a:off x="5204451" y="125253"/>
+              <a:ext cx="365760" cy="299258"/>
+              <a:chOff x="623455" y="856211"/>
+              <a:chExt cx="498763" cy="415636"/>
+            </a:xfrm>
+          </p:grpSpPr>
+          <p:sp>
+            <p:nvSpPr>
+              <p:cNvPr id="15" name="Rectangle: Rounded Corners 14">
+                <a:extLst>
+                  <a:ext uri="{FF2B5EF4-FFF2-40B4-BE49-F238E27FC236}">
+                    <a16:creationId xmlns:a16="http://schemas.microsoft.com/office/drawing/2014/main" id="{E3CE49D6-69C2-415F-871F-03C79060A46C}"/>
+                  </a:ext>
+                </a:extLst>
+              </p:cNvPr>
+              <p:cNvSpPr/>
+              <p:nvPr/>
+            </p:nvSpPr>
+            <p:spPr>
+              <a:xfrm>
+                <a:off x="623455" y="856211"/>
+                <a:ext cx="498763" cy="415636"/>
+              </a:xfrm>
+              <a:prstGeom prst="roundRect">
+                <a:avLst/>
+              </a:prstGeom>
+              <a:solidFill>
+                <a:srgbClr val="BFA458"/>
+              </a:solidFill>
+            </p:spPr>
+            <p:style>
+              <a:lnRef idx="2">
+                <a:schemeClr val="accent1">
+                  <a:shade val="50000"/>
+                </a:schemeClr>
+              </a:lnRef>
+              <a:fillRef idx="1">
+                <a:schemeClr val="accent1"/>
+              </a:fillRef>
+              <a:effectRef idx="0">
+                <a:schemeClr val="accent1"/>
+              </a:effectRef>
+              <a:fontRef idx="minor">
+                <a:schemeClr val="lt1"/>
+              </a:fontRef>
+            </p:style>
+            <p:txBody>
+              <a:bodyPr rtlCol="0" anchor="ctr"/>
+              <a:lstStyle/>
+              <a:p>
+                <a:pPr algn="ctr"/>
+                <a:endParaRPr lang="en-US"/>
+              </a:p>
+            </p:txBody>
+          </p:sp>
+          <p:grpSp>
+            <p:nvGrpSpPr>
+              <p:cNvPr id="23" name="Group 22">
+                <a:extLst>
+                  <a:ext uri="{FF2B5EF4-FFF2-40B4-BE49-F238E27FC236}">
+                    <a16:creationId xmlns:a16="http://schemas.microsoft.com/office/drawing/2014/main" id="{D29B8480-3034-4BEC-BD52-2E8E428D7E2A}"/>
+                  </a:ext>
+                </a:extLst>
+              </p:cNvPr>
+              <p:cNvGrpSpPr/>
+              <p:nvPr/>
+            </p:nvGrpSpPr>
+            <p:grpSpPr>
+              <a:xfrm>
+                <a:off x="724038" y="950768"/>
+                <a:ext cx="297595" cy="226521"/>
+                <a:chOff x="999190" y="1753985"/>
+                <a:chExt cx="297595" cy="226521"/>
+              </a:xfrm>
+            </p:grpSpPr>
+            <p:sp>
+              <p:nvSpPr>
+                <p:cNvPr id="16" name="Oval 15">
+                  <a:extLst>
+                    <a:ext uri="{FF2B5EF4-FFF2-40B4-BE49-F238E27FC236}">
+                      <a16:creationId xmlns:a16="http://schemas.microsoft.com/office/drawing/2014/main" id="{26AA5EC4-DB01-411B-BEB0-7A1DC3DE4D52}"/>
+                    </a:ext>
+                  </a:extLst>
+                </p:cNvPr>
+                <p:cNvSpPr/>
+                <p:nvPr/>
+              </p:nvSpPr>
+              <p:spPr>
+                <a:xfrm>
+                  <a:off x="1122218" y="1753985"/>
+                  <a:ext cx="174567" cy="166255"/>
+                </a:xfrm>
+                <a:prstGeom prst="ellipse">
+                  <a:avLst/>
+                </a:prstGeom>
+                <a:solidFill>
+                  <a:schemeClr val="bg1"/>
+                </a:solidFill>
+                <a:ln>
+                  <a:solidFill>
+                    <a:srgbClr val="192857"/>
+                  </a:solidFill>
+                </a:ln>
+              </p:spPr>
+              <p:style>
+                <a:lnRef idx="2">
+                  <a:schemeClr val="accent1">
+                    <a:shade val="50000"/>
+                  </a:schemeClr>
+                </a:lnRef>
+                <a:fillRef idx="1">
+                  <a:schemeClr val="accent1"/>
+                </a:fillRef>
+                <a:effectRef idx="0">
+                  <a:schemeClr val="accent1"/>
+                </a:effectRef>
+                <a:fontRef idx="minor">
+                  <a:schemeClr val="lt1"/>
+                </a:fontRef>
+              </p:style>
+              <p:txBody>
+                <a:bodyPr rtlCol="0" anchor="ctr"/>
+                <a:lstStyle/>
+                <a:p>
+                  <a:pPr algn="ctr"/>
+                  <a:endParaRPr lang="en-US" dirty="0"/>
+                </a:p>
+              </p:txBody>
+            </p:sp>
+            <p:sp>
+              <p:nvSpPr>
+                <p:cNvPr id="22" name="Rectangle 21">
+                  <a:extLst>
+                    <a:ext uri="{FF2B5EF4-FFF2-40B4-BE49-F238E27FC236}">
+                      <a16:creationId xmlns:a16="http://schemas.microsoft.com/office/drawing/2014/main" id="{488E4FD0-E27B-4AC8-85D0-A56358F1DD34}"/>
+                    </a:ext>
+                  </a:extLst>
+                </p:cNvPr>
+                <p:cNvSpPr/>
+                <p:nvPr/>
+              </p:nvSpPr>
+              <p:spPr>
+                <a:xfrm rot="2802451">
+                  <a:off x="1063614" y="1870363"/>
+                  <a:ext cx="45719" cy="174567"/>
+                </a:xfrm>
+                <a:prstGeom prst="rect">
+                  <a:avLst/>
+                </a:prstGeom>
+                <a:solidFill>
+                  <a:srgbClr val="192857"/>
+                </a:solidFill>
+                <a:ln>
+                  <a:solidFill>
+                    <a:srgbClr val="192857"/>
+                  </a:solidFill>
+                </a:ln>
+              </p:spPr>
+              <p:style>
+                <a:lnRef idx="2">
+                  <a:schemeClr val="accent1">
+                    <a:shade val="50000"/>
+                  </a:schemeClr>
+                </a:lnRef>
+                <a:fillRef idx="1">
+                  <a:schemeClr val="accent1"/>
+                </a:fillRef>
+                <a:effectRef idx="0">
+                  <a:schemeClr val="accent1"/>
+                </a:effectRef>
+                <a:fontRef idx="minor">
+                  <a:schemeClr val="lt1"/>
+                </a:fontRef>
+              </p:style>
+              <p:txBody>
+                <a:bodyPr rtlCol="0" anchor="ctr"/>
+                <a:lstStyle/>
+                <a:p>
+                  <a:pPr algn="ctr"/>
+                  <a:endParaRPr lang="en-US"/>
+                </a:p>
+              </p:txBody>
+            </p:sp>
+          </p:grpSp>
+        </p:grpSp>
+        <p:sp>
+          <p:nvSpPr>
+            <p:cNvPr id="28" name="TextBox 27">
+              <a:extLst>
+                <a:ext uri="{FF2B5EF4-FFF2-40B4-BE49-F238E27FC236}">
+                  <a16:creationId xmlns:a16="http://schemas.microsoft.com/office/drawing/2014/main" id="{73C1C642-37DD-4A5A-AEE1-3BB8CDC3450F}"/>
+                </a:ext>
+              </a:extLst>
+            </p:cNvPr>
+            <p:cNvSpPr txBox="1"/>
+            <p:nvPr/>
+          </p:nvSpPr>
+          <p:spPr>
+            <a:xfrm>
+              <a:off x="9205371" y="142265"/>
+              <a:ext cx="1676367" cy="307777"/>
+            </a:xfrm>
+            <a:prstGeom prst="rect">
+              <a:avLst/>
+            </a:prstGeom>
+            <a:noFill/>
+          </p:spPr>
+          <p:txBody>
+            <a:bodyPr wrap="square" rtlCol="0">
+              <a:spAutoFit/>
+            </a:bodyPr>
+            <a:lstStyle/>
+            <a:p>
+              <a:r>
+                <a:rPr lang="en-US" sz="1400" dirty="0">
+                  <a:solidFill>
+                    <a:srgbClr val="BFA458"/>
+                  </a:solidFill>
+                  <a:latin typeface="Arial Black" panose="020B0A04020102020204" pitchFamily="34" charset="0"/>
+                  <a:cs typeface="Aharoni" panose="02010803020104030203" pitchFamily="2" charset="-79"/>
+                </a:rPr>
+                <a:t>Username1234</a:t>
+              </a:r>
+            </a:p>
+          </p:txBody>
+        </p:sp>
         <p:sp>
           <p:nvSpPr>
             <p:cNvPr id="6" name="TextBox 5">
@@ -6440,7 +6204,7 @@
           </p:nvSpPr>
           <p:spPr>
             <a:xfrm>
-              <a:off x="1257373" y="662767"/>
+              <a:off x="832857" y="119877"/>
               <a:ext cx="1004299" cy="369332"/>
             </a:xfrm>
             <a:prstGeom prst="rect">
@@ -6498,7 +6262,7 @@
           </p:blipFill>
           <p:spPr>
             <a:xfrm>
-              <a:off x="904863" y="650049"/>
+              <a:off x="444176" y="92087"/>
               <a:ext cx="369332" cy="369332"/>
             </a:xfrm>
             <a:prstGeom prst="rect">
@@ -6508,10 +6272,10 @@
         </p:pic>
         <p:sp>
           <p:nvSpPr>
-            <p:cNvPr id="72" name="Rectangle: Rounded Corners 71">
+            <p:cNvPr id="7" name="Rectangle 6">
               <a:extLst>
                 <a:ext uri="{FF2B5EF4-FFF2-40B4-BE49-F238E27FC236}">
-                  <a16:creationId xmlns:a16="http://schemas.microsoft.com/office/drawing/2014/main" id="{B10CC6DC-7FAD-4DE0-8757-5FEBB7DB618D}"/>
+                  <a16:creationId xmlns:a16="http://schemas.microsoft.com/office/drawing/2014/main" id="{692D25E1-B712-43D9-ADFB-F3C45FE86BE7}"/>
                 </a:ext>
               </a:extLst>
             </p:cNvPr>
@@ -6520,10 +6284,10 @@
           </p:nvSpPr>
           <p:spPr>
             <a:xfrm>
-              <a:off x="843672" y="540620"/>
-              <a:ext cx="1498313" cy="633147"/>
+              <a:off x="340039" y="-5519"/>
+              <a:ext cx="1571179" cy="638665"/>
             </a:xfrm>
-            <a:prstGeom prst="roundRect">
+            <a:prstGeom prst="rect">
               <a:avLst/>
             </a:prstGeom>
             <a:noFill/>
@@ -6554,56 +6318,447 @@
             <a:lstStyle/>
             <a:p>
               <a:pPr algn="ctr"/>
-              <a:endParaRPr lang="en-US" sz="1400" dirty="0">
-                <a:solidFill>
-                  <a:srgbClr val="BFA458"/>
-                </a:solidFill>
-                <a:latin typeface="Arial Black" panose="020B0A04020102020204" pitchFamily="34" charset="0"/>
-                <a:cs typeface="Aharoni" panose="02010803020104030203" pitchFamily="2" charset="-79"/>
-              </a:endParaRPr>
+              <a:endParaRPr lang="en-US"/>
+            </a:p>
+          </p:txBody>
+        </p:sp>
+        <p:sp>
+          <p:nvSpPr>
+            <p:cNvPr id="73" name="Rectangle 72">
+              <a:extLst>
+                <a:ext uri="{FF2B5EF4-FFF2-40B4-BE49-F238E27FC236}">
+                  <a16:creationId xmlns:a16="http://schemas.microsoft.com/office/drawing/2014/main" id="{46D642D7-4CB3-428A-A377-A86816E60251}"/>
+                </a:ext>
+              </a:extLst>
+            </p:cNvPr>
+            <p:cNvSpPr/>
+            <p:nvPr/>
+          </p:nvSpPr>
+          <p:spPr>
+            <a:xfrm>
+              <a:off x="6006810" y="0"/>
+              <a:ext cx="1571179" cy="638665"/>
+            </a:xfrm>
+            <a:prstGeom prst="rect">
+              <a:avLst/>
+            </a:prstGeom>
+            <a:noFill/>
+            <a:ln w="25400">
+              <a:solidFill>
+                <a:srgbClr val="BFA458"/>
+              </a:solidFill>
+            </a:ln>
+          </p:spPr>
+          <p:style>
+            <a:lnRef idx="2">
+              <a:schemeClr val="accent1">
+                <a:shade val="50000"/>
+              </a:schemeClr>
+            </a:lnRef>
+            <a:fillRef idx="1">
+              <a:schemeClr val="accent1"/>
+            </a:fillRef>
+            <a:effectRef idx="0">
+              <a:schemeClr val="accent1"/>
+            </a:effectRef>
+            <a:fontRef idx="minor">
+              <a:schemeClr val="lt1"/>
+            </a:fontRef>
+          </p:style>
+          <p:txBody>
+            <a:bodyPr rtlCol="0" anchor="ctr"/>
+            <a:lstStyle/>
+            <a:p>
+              <a:pPr algn="ctr"/>
+              <a:endParaRPr lang="en-US"/>
+            </a:p>
+          </p:txBody>
+        </p:sp>
+        <p:sp>
+          <p:nvSpPr>
+            <p:cNvPr id="74" name="Rectangle 73">
+              <a:extLst>
+                <a:ext uri="{FF2B5EF4-FFF2-40B4-BE49-F238E27FC236}">
+                  <a16:creationId xmlns:a16="http://schemas.microsoft.com/office/drawing/2014/main" id="{0F4EADE8-688B-4FC8-AC3D-5068DE527A89}"/>
+                </a:ext>
+              </a:extLst>
+            </p:cNvPr>
+            <p:cNvSpPr/>
+            <p:nvPr/>
+          </p:nvSpPr>
+          <p:spPr>
+            <a:xfrm>
+              <a:off x="7584945" y="-3621"/>
+              <a:ext cx="1571179" cy="638665"/>
+            </a:xfrm>
+            <a:prstGeom prst="rect">
+              <a:avLst/>
+            </a:prstGeom>
+            <a:noFill/>
+            <a:ln w="25400">
+              <a:solidFill>
+                <a:srgbClr val="BFA458"/>
+              </a:solidFill>
+            </a:ln>
+          </p:spPr>
+          <p:style>
+            <a:lnRef idx="2">
+              <a:schemeClr val="accent1">
+                <a:shade val="50000"/>
+              </a:schemeClr>
+            </a:lnRef>
+            <a:fillRef idx="1">
+              <a:schemeClr val="accent1"/>
+            </a:fillRef>
+            <a:effectRef idx="0">
+              <a:schemeClr val="accent1"/>
+            </a:effectRef>
+            <a:fontRef idx="minor">
+              <a:schemeClr val="lt1"/>
+            </a:fontRef>
+          </p:style>
+          <p:txBody>
+            <a:bodyPr rtlCol="0" anchor="ctr"/>
+            <a:lstStyle/>
+            <a:p>
+              <a:pPr algn="ctr"/>
+              <a:endParaRPr lang="en-US"/>
+            </a:p>
+          </p:txBody>
+        </p:sp>
+        <p:sp>
+          <p:nvSpPr>
+            <p:cNvPr id="75" name="Rectangle 74">
+              <a:extLst>
+                <a:ext uri="{FF2B5EF4-FFF2-40B4-BE49-F238E27FC236}">
+                  <a16:creationId xmlns:a16="http://schemas.microsoft.com/office/drawing/2014/main" id="{3F9D04D2-EE8B-4A0C-A3CB-BD8E0D32A66D}"/>
+                </a:ext>
+              </a:extLst>
+            </p:cNvPr>
+            <p:cNvSpPr/>
+            <p:nvPr/>
+          </p:nvSpPr>
+          <p:spPr>
+            <a:xfrm>
+              <a:off x="9163081" y="-694"/>
+              <a:ext cx="2155614" cy="638665"/>
+            </a:xfrm>
+            <a:prstGeom prst="rect">
+              <a:avLst/>
+            </a:prstGeom>
+            <a:noFill/>
+            <a:ln w="25400">
+              <a:solidFill>
+                <a:srgbClr val="BFA458"/>
+              </a:solidFill>
+            </a:ln>
+          </p:spPr>
+          <p:style>
+            <a:lnRef idx="2">
+              <a:schemeClr val="accent1">
+                <a:shade val="50000"/>
+              </a:schemeClr>
+            </a:lnRef>
+            <a:fillRef idx="1">
+              <a:schemeClr val="accent1"/>
+            </a:fillRef>
+            <a:effectRef idx="0">
+              <a:schemeClr val="accent1"/>
+            </a:effectRef>
+            <a:fontRef idx="minor">
+              <a:schemeClr val="lt1"/>
+            </a:fontRef>
+          </p:style>
+          <p:txBody>
+            <a:bodyPr rtlCol="0" anchor="ctr"/>
+            <a:lstStyle/>
+            <a:p>
+              <a:pPr algn="ctr"/>
+              <a:endParaRPr lang="en-US"/>
+            </a:p>
+          </p:txBody>
+        </p:sp>
+        <p:sp>
+          <p:nvSpPr>
+            <p:cNvPr id="8" name="Isosceles Triangle 7">
+              <a:extLst>
+                <a:ext uri="{FF2B5EF4-FFF2-40B4-BE49-F238E27FC236}">
+                  <a16:creationId xmlns:a16="http://schemas.microsoft.com/office/drawing/2014/main" id="{99C48DE2-64E8-41EB-B45D-3122F45AEC9E}"/>
+                </a:ext>
+              </a:extLst>
+            </p:cNvPr>
+            <p:cNvSpPr/>
+            <p:nvPr/>
+          </p:nvSpPr>
+          <p:spPr>
+            <a:xfrm rot="10800000">
+              <a:off x="10926506" y="201708"/>
+              <a:ext cx="261256" cy="211142"/>
+            </a:xfrm>
+            <a:prstGeom prst="triangle">
+              <a:avLst/>
+            </a:prstGeom>
+            <a:solidFill>
+              <a:srgbClr val="BFA458"/>
+            </a:solidFill>
+            <a:ln>
+              <a:solidFill>
+                <a:srgbClr val="192857"/>
+              </a:solidFill>
+            </a:ln>
+          </p:spPr>
+          <p:style>
+            <a:lnRef idx="2">
+              <a:schemeClr val="accent1">
+                <a:shade val="50000"/>
+              </a:schemeClr>
+            </a:lnRef>
+            <a:fillRef idx="1">
+              <a:schemeClr val="accent1"/>
+            </a:fillRef>
+            <a:effectRef idx="0">
+              <a:schemeClr val="accent1"/>
+            </a:effectRef>
+            <a:fontRef idx="minor">
+              <a:schemeClr val="lt1"/>
+            </a:fontRef>
+          </p:style>
+          <p:txBody>
+            <a:bodyPr rtlCol="0" anchor="ctr"/>
+            <a:lstStyle/>
+            <a:p>
+              <a:pPr algn="ctr"/>
+              <a:endParaRPr lang="en-US"/>
+            </a:p>
+          </p:txBody>
+        </p:sp>
+        <p:sp>
+          <p:nvSpPr>
+            <p:cNvPr id="76" name="TextBox 75">
+              <a:extLst>
+                <a:ext uri="{FF2B5EF4-FFF2-40B4-BE49-F238E27FC236}">
+                  <a16:creationId xmlns:a16="http://schemas.microsoft.com/office/drawing/2014/main" id="{AE94C231-C17E-4131-867E-9022F9EF938D}"/>
+                </a:ext>
+              </a:extLst>
+            </p:cNvPr>
+            <p:cNvSpPr txBox="1"/>
+            <p:nvPr/>
+          </p:nvSpPr>
+          <p:spPr>
+            <a:xfrm>
+              <a:off x="6107843" y="39139"/>
+              <a:ext cx="1298402" cy="584775"/>
+            </a:xfrm>
+            <a:prstGeom prst="rect">
+              <a:avLst/>
+            </a:prstGeom>
+            <a:noFill/>
+          </p:spPr>
+          <p:txBody>
+            <a:bodyPr wrap="square" rtlCol="0">
+              <a:spAutoFit/>
+            </a:bodyPr>
+            <a:lstStyle/>
+            <a:p>
+              <a:pPr algn="ctr"/>
+              <a:r>
+                <a:rPr lang="en-US" sz="1600" dirty="0">
+                  <a:solidFill>
+                    <a:srgbClr val="BFA458"/>
+                  </a:solidFill>
+                  <a:latin typeface="Arial Black" panose="020B0A04020102020204" pitchFamily="34" charset="0"/>
+                  <a:cs typeface="Aharoni" panose="02010803020104030203" pitchFamily="2" charset="-79"/>
+                </a:rPr>
+                <a:t>Filter </a:t>
+              </a:r>
+            </a:p>
+            <a:p>
+              <a:pPr algn="ctr"/>
+              <a:r>
+                <a:rPr lang="en-US" sz="1600" dirty="0">
+                  <a:solidFill>
+                    <a:srgbClr val="BFA458"/>
+                  </a:solidFill>
+                  <a:latin typeface="Arial Black" panose="020B0A04020102020204" pitchFamily="34" charset="0"/>
+                  <a:cs typeface="Aharoni" panose="02010803020104030203" pitchFamily="2" charset="-79"/>
+                </a:rPr>
+                <a:t>Search</a:t>
+              </a:r>
+            </a:p>
+          </p:txBody>
+        </p:sp>
+        <p:sp>
+          <p:nvSpPr>
+            <p:cNvPr id="78" name="TextBox 77">
+              <a:extLst>
+                <a:ext uri="{FF2B5EF4-FFF2-40B4-BE49-F238E27FC236}">
+                  <a16:creationId xmlns:a16="http://schemas.microsoft.com/office/drawing/2014/main" id="{15B0FF04-2161-4A39-B564-86E3AF7EDD89}"/>
+                </a:ext>
+              </a:extLst>
+            </p:cNvPr>
+            <p:cNvSpPr txBox="1"/>
+            <p:nvPr/>
+          </p:nvSpPr>
+          <p:spPr>
+            <a:xfrm>
+              <a:off x="7546460" y="45024"/>
+              <a:ext cx="1508289" cy="584775"/>
+            </a:xfrm>
+            <a:prstGeom prst="rect">
+              <a:avLst/>
+            </a:prstGeom>
+            <a:noFill/>
+          </p:spPr>
+          <p:txBody>
+            <a:bodyPr wrap="square" rtlCol="0">
+              <a:spAutoFit/>
+            </a:bodyPr>
+            <a:lstStyle/>
+            <a:p>
+              <a:pPr algn="ctr"/>
+              <a:r>
+                <a:rPr lang="en-US" sz="1600" dirty="0">
+                  <a:solidFill>
+                    <a:srgbClr val="BFA458"/>
+                  </a:solidFill>
+                  <a:latin typeface="Arial Black" panose="020B0A04020102020204" pitchFamily="34" charset="0"/>
+                  <a:cs typeface="Aharoni" panose="02010803020104030203" pitchFamily="2" charset="-79"/>
+                </a:rPr>
+                <a:t>Create Posting</a:t>
+              </a:r>
             </a:p>
           </p:txBody>
         </p:sp>
       </p:grpSp>
-      <p:sp>
-        <p:nvSpPr>
-          <p:cNvPr id="2" name="TextBox 1">
-            <a:extLst>
-              <a:ext uri="{FF2B5EF4-FFF2-40B4-BE49-F238E27FC236}">
-                <a16:creationId xmlns:a16="http://schemas.microsoft.com/office/drawing/2014/main" id="{1291F3B4-3B52-4D14-B58E-E1A90E7F1BCF}"/>
-              </a:ext>
-            </a:extLst>
-          </p:cNvPr>
-          <p:cNvSpPr txBox="1"/>
+      <p:grpSp>
+        <p:nvGrpSpPr>
+          <p:cNvPr id="81" name="Group 80">
+            <a:extLst>
+              <a:ext uri="{FF2B5EF4-FFF2-40B4-BE49-F238E27FC236}">
+                <a16:creationId xmlns:a16="http://schemas.microsoft.com/office/drawing/2014/main" id="{9DE94436-9F3D-472C-9E7B-4FCF2512669E}"/>
+              </a:ext>
+            </a:extLst>
+          </p:cNvPr>
+          <p:cNvGrpSpPr/>
           <p:nvPr/>
-        </p:nvSpPr>
-        <p:spPr>
+        </p:nvGrpSpPr>
+        <p:grpSpPr>
           <a:xfrm>
-            <a:off x="9634176" y="4950390"/>
-            <a:ext cx="1081748" cy="954107"/>
+            <a:off x="11986372" y="633146"/>
+            <a:ext cx="200961" cy="6217920"/>
+            <a:chOff x="11808505" y="886406"/>
+            <a:chExt cx="182879" cy="5943600"/>
           </a:xfrm>
-          <a:prstGeom prst="rect">
-            <a:avLst/>
-          </a:prstGeom>
-          <a:noFill/>
-        </p:spPr>
-        <p:txBody>
-          <a:bodyPr wrap="square" rtlCol="0">
-            <a:spAutoFit/>
-          </a:bodyPr>
-          <a:lstStyle/>
-          <a:p>
-            <a:r>
-              <a:rPr lang="en-US" sz="2800" b="1" dirty="0">
-                <a:highlight>
-                  <a:srgbClr val="FFFF00"/>
-                </a:highlight>
-              </a:rPr>
-              <a:t>USER VIEW</a:t>
-            </a:r>
-          </a:p>
-        </p:txBody>
-      </p:sp>
+        </p:grpSpPr>
+        <p:sp>
+          <p:nvSpPr>
+            <p:cNvPr id="82" name="Rectangle 81">
+              <a:extLst>
+                <a:ext uri="{FF2B5EF4-FFF2-40B4-BE49-F238E27FC236}">
+                  <a16:creationId xmlns:a16="http://schemas.microsoft.com/office/drawing/2014/main" id="{152844C7-0366-4004-B118-EC98E092660D}"/>
+                </a:ext>
+              </a:extLst>
+            </p:cNvPr>
+            <p:cNvSpPr/>
+            <p:nvPr/>
+          </p:nvSpPr>
+          <p:spPr>
+            <a:xfrm>
+              <a:off x="11808505" y="886406"/>
+              <a:ext cx="182879" cy="5943600"/>
+            </a:xfrm>
+            <a:prstGeom prst="rect">
+              <a:avLst/>
+            </a:prstGeom>
+            <a:solidFill>
+              <a:srgbClr val="E7E6E6"/>
+            </a:solidFill>
+            <a:ln w="25400">
+              <a:solidFill>
+                <a:srgbClr val="192857"/>
+              </a:solidFill>
+            </a:ln>
+          </p:spPr>
+          <p:style>
+            <a:lnRef idx="2">
+              <a:schemeClr val="accent1">
+                <a:shade val="50000"/>
+              </a:schemeClr>
+            </a:lnRef>
+            <a:fillRef idx="1">
+              <a:schemeClr val="accent1"/>
+            </a:fillRef>
+            <a:effectRef idx="0">
+              <a:schemeClr val="accent1"/>
+            </a:effectRef>
+            <a:fontRef idx="minor">
+              <a:schemeClr val="lt1"/>
+            </a:fontRef>
+          </p:style>
+          <p:txBody>
+            <a:bodyPr rtlCol="0" anchor="ctr"/>
+            <a:lstStyle/>
+            <a:p>
+              <a:pPr algn="ctr"/>
+              <a:endParaRPr lang="en-US"/>
+            </a:p>
+          </p:txBody>
+        </p:sp>
+        <p:sp>
+          <p:nvSpPr>
+            <p:cNvPr id="83" name="Rectangle 82">
+              <a:extLst>
+                <a:ext uri="{FF2B5EF4-FFF2-40B4-BE49-F238E27FC236}">
+                  <a16:creationId xmlns:a16="http://schemas.microsoft.com/office/drawing/2014/main" id="{C51AFCFC-9F90-43FF-9A1F-81442D69F588}"/>
+                </a:ext>
+              </a:extLst>
+            </p:cNvPr>
+            <p:cNvSpPr/>
+            <p:nvPr/>
+          </p:nvSpPr>
+          <p:spPr>
+            <a:xfrm>
+              <a:off x="11827171" y="905070"/>
+              <a:ext cx="146304" cy="3402727"/>
+            </a:xfrm>
+            <a:prstGeom prst="rect">
+              <a:avLst/>
+            </a:prstGeom>
+            <a:solidFill>
+              <a:srgbClr val="BFA458"/>
+            </a:solidFill>
+            <a:ln>
+              <a:solidFill>
+                <a:srgbClr val="BFA458"/>
+              </a:solidFill>
+            </a:ln>
+          </p:spPr>
+          <p:style>
+            <a:lnRef idx="2">
+              <a:schemeClr val="accent1">
+                <a:shade val="50000"/>
+              </a:schemeClr>
+            </a:lnRef>
+            <a:fillRef idx="1">
+              <a:schemeClr val="accent1"/>
+            </a:fillRef>
+            <a:effectRef idx="0">
+              <a:schemeClr val="accent1"/>
+            </a:effectRef>
+            <a:fontRef idx="minor">
+              <a:schemeClr val="lt1"/>
+            </a:fontRef>
+          </p:style>
+          <p:txBody>
+            <a:bodyPr rtlCol="0" anchor="ctr"/>
+            <a:lstStyle/>
+            <a:p>
+              <a:pPr algn="ctr"/>
+              <a:endParaRPr lang="en-US"/>
+            </a:p>
+          </p:txBody>
+        </p:sp>
+      </p:grpSp>
     </p:spTree>
     <p:extLst>
       <p:ext uri="{BB962C8B-B14F-4D97-AF65-F5344CB8AC3E}">
@@ -6644,10 +6799,10 @@
       </p:grpSpPr>
       <p:sp>
         <p:nvSpPr>
-          <p:cNvPr id="19" name="Rectangle 18">
-            <a:extLst>
-              <a:ext uri="{FF2B5EF4-FFF2-40B4-BE49-F238E27FC236}">
-                <a16:creationId xmlns:a16="http://schemas.microsoft.com/office/drawing/2014/main" id="{8DD4FEDB-CFCD-4C4A-9F15-CA9293D85673}"/>
+          <p:cNvPr id="39" name="Rectangle 38">
+            <a:extLst>
+              <a:ext uri="{FF2B5EF4-FFF2-40B4-BE49-F238E27FC236}">
+                <a16:creationId xmlns:a16="http://schemas.microsoft.com/office/drawing/2014/main" id="{5ED8E4AF-EA0E-4482-A7F5-E8E190A83288}"/>
               </a:ext>
             </a:extLst>
           </p:cNvPr>
@@ -6656,844 +6811,8 @@
         </p:nvSpPr>
         <p:spPr>
           <a:xfrm>
-            <a:off x="0" y="-5518"/>
-            <a:ext cx="12192000" cy="638665"/>
-          </a:xfrm>
-          <a:prstGeom prst="rect">
-            <a:avLst/>
-          </a:prstGeom>
-          <a:solidFill>
-            <a:srgbClr val="192857"/>
-          </a:solidFill>
-        </p:spPr>
-        <p:style>
-          <a:lnRef idx="2">
-            <a:schemeClr val="accent1">
-              <a:shade val="50000"/>
-            </a:schemeClr>
-          </a:lnRef>
-          <a:fillRef idx="1">
-            <a:schemeClr val="accent1"/>
-          </a:fillRef>
-          <a:effectRef idx="0">
-            <a:schemeClr val="accent1"/>
-          </a:effectRef>
-          <a:fontRef idx="minor">
-            <a:schemeClr val="lt1"/>
-          </a:fontRef>
-        </p:style>
-        <p:txBody>
-          <a:bodyPr rtlCol="0" anchor="ctr"/>
-          <a:lstStyle/>
-          <a:p>
-            <a:pPr algn="ctr"/>
-            <a:endParaRPr lang="en-US"/>
-          </a:p>
-        </p:txBody>
-      </p:sp>
-      <p:grpSp>
-        <p:nvGrpSpPr>
-          <p:cNvPr id="20" name="Group 19">
-            <a:extLst>
-              <a:ext uri="{FF2B5EF4-FFF2-40B4-BE49-F238E27FC236}">
-                <a16:creationId xmlns:a16="http://schemas.microsoft.com/office/drawing/2014/main" id="{0D4FBA0E-B4A0-406D-9333-29B40875CED4}"/>
-              </a:ext>
-            </a:extLst>
-          </p:cNvPr>
-          <p:cNvGrpSpPr/>
-          <p:nvPr/>
-        </p:nvGrpSpPr>
-        <p:grpSpPr>
-          <a:xfrm>
-            <a:off x="2023927" y="97421"/>
-            <a:ext cx="3028757" cy="378073"/>
-            <a:chOff x="3427615" y="123834"/>
-            <a:chExt cx="2668385" cy="378073"/>
-          </a:xfrm>
-        </p:grpSpPr>
-        <p:sp>
-          <p:nvSpPr>
-            <p:cNvPr id="21" name="Rectangle: Rounded Corners 20">
-              <a:extLst>
-                <a:ext uri="{FF2B5EF4-FFF2-40B4-BE49-F238E27FC236}">
-                  <a16:creationId xmlns:a16="http://schemas.microsoft.com/office/drawing/2014/main" id="{6715BECB-9583-4D0E-BAC9-0A2805AEF5C7}"/>
-                </a:ext>
-              </a:extLst>
-            </p:cNvPr>
-            <p:cNvSpPr/>
-            <p:nvPr/>
-          </p:nvSpPr>
-          <p:spPr>
-            <a:xfrm>
-              <a:off x="3427615" y="132575"/>
-              <a:ext cx="2668385" cy="369332"/>
-            </a:xfrm>
-            <a:prstGeom prst="roundRect">
-              <a:avLst/>
-            </a:prstGeom>
-            <a:solidFill>
-              <a:srgbClr val="F2F2F2"/>
-            </a:solidFill>
-          </p:spPr>
-          <p:style>
-            <a:lnRef idx="2">
-              <a:schemeClr val="accent1">
-                <a:shade val="50000"/>
-              </a:schemeClr>
-            </a:lnRef>
-            <a:fillRef idx="1">
-              <a:schemeClr val="accent1"/>
-            </a:fillRef>
-            <a:effectRef idx="0">
-              <a:schemeClr val="accent1"/>
-            </a:effectRef>
-            <a:fontRef idx="minor">
-              <a:schemeClr val="lt1"/>
-            </a:fontRef>
-          </p:style>
-          <p:txBody>
-            <a:bodyPr rtlCol="0" anchor="ctr"/>
-            <a:lstStyle/>
-            <a:p>
-              <a:pPr algn="ctr"/>
-              <a:endParaRPr lang="en-US"/>
-            </a:p>
-          </p:txBody>
-        </p:sp>
-        <p:sp>
-          <p:nvSpPr>
-            <p:cNvPr id="22" name="TextBox 21">
-              <a:extLst>
-                <a:ext uri="{FF2B5EF4-FFF2-40B4-BE49-F238E27FC236}">
-                  <a16:creationId xmlns:a16="http://schemas.microsoft.com/office/drawing/2014/main" id="{7236CA87-080B-4085-A6B5-5F4F3494337C}"/>
-                </a:ext>
-              </a:extLst>
-            </p:cNvPr>
-            <p:cNvSpPr txBox="1"/>
-            <p:nvPr/>
-          </p:nvSpPr>
-          <p:spPr>
-            <a:xfrm>
-              <a:off x="3427615" y="123834"/>
-              <a:ext cx="2402378" cy="369332"/>
-            </a:xfrm>
-            <a:prstGeom prst="rect">
-              <a:avLst/>
-            </a:prstGeom>
-            <a:noFill/>
-          </p:spPr>
-          <p:txBody>
-            <a:bodyPr wrap="square" rtlCol="0">
-              <a:spAutoFit/>
-            </a:bodyPr>
-            <a:lstStyle/>
-            <a:p>
-              <a:r>
-                <a:rPr lang="en-US" dirty="0">
-                  <a:solidFill>
-                    <a:schemeClr val="bg2">
-                      <a:lumMod val="50000"/>
-                    </a:schemeClr>
-                  </a:solidFill>
-                </a:rPr>
-                <a:t>Quick Search…</a:t>
-              </a:r>
-            </a:p>
-          </p:txBody>
-        </p:sp>
-      </p:grpSp>
-      <p:grpSp>
-        <p:nvGrpSpPr>
-          <p:cNvPr id="23" name="Group 22">
-            <a:extLst>
-              <a:ext uri="{FF2B5EF4-FFF2-40B4-BE49-F238E27FC236}">
-                <a16:creationId xmlns:a16="http://schemas.microsoft.com/office/drawing/2014/main" id="{A189806E-C0B8-417E-A125-E4FE62AF7DF3}"/>
-              </a:ext>
-            </a:extLst>
-          </p:cNvPr>
-          <p:cNvGrpSpPr/>
-          <p:nvPr/>
-        </p:nvGrpSpPr>
-        <p:grpSpPr>
-          <a:xfrm>
-            <a:off x="5204451" y="125253"/>
-            <a:ext cx="365760" cy="299258"/>
-            <a:chOff x="623455" y="856211"/>
-            <a:chExt cx="498763" cy="415636"/>
-          </a:xfrm>
-        </p:grpSpPr>
-        <p:sp>
-          <p:nvSpPr>
-            <p:cNvPr id="24" name="Rectangle: Rounded Corners 23">
-              <a:extLst>
-                <a:ext uri="{FF2B5EF4-FFF2-40B4-BE49-F238E27FC236}">
-                  <a16:creationId xmlns:a16="http://schemas.microsoft.com/office/drawing/2014/main" id="{55FC36AA-050D-4EE6-8348-6FEA7060C5E1}"/>
-                </a:ext>
-              </a:extLst>
-            </p:cNvPr>
-            <p:cNvSpPr/>
-            <p:nvPr/>
-          </p:nvSpPr>
-          <p:spPr>
-            <a:xfrm>
-              <a:off x="623455" y="856211"/>
-              <a:ext cx="498763" cy="415636"/>
-            </a:xfrm>
-            <a:prstGeom prst="roundRect">
-              <a:avLst/>
-            </a:prstGeom>
-            <a:solidFill>
-              <a:srgbClr val="BFA458"/>
-            </a:solidFill>
-          </p:spPr>
-          <p:style>
-            <a:lnRef idx="2">
-              <a:schemeClr val="accent1">
-                <a:shade val="50000"/>
-              </a:schemeClr>
-            </a:lnRef>
-            <a:fillRef idx="1">
-              <a:schemeClr val="accent1"/>
-            </a:fillRef>
-            <a:effectRef idx="0">
-              <a:schemeClr val="accent1"/>
-            </a:effectRef>
-            <a:fontRef idx="minor">
-              <a:schemeClr val="lt1"/>
-            </a:fontRef>
-          </p:style>
-          <p:txBody>
-            <a:bodyPr rtlCol="0" anchor="ctr"/>
-            <a:lstStyle/>
-            <a:p>
-              <a:pPr algn="ctr"/>
-              <a:endParaRPr lang="en-US"/>
-            </a:p>
-          </p:txBody>
-        </p:sp>
-        <p:grpSp>
-          <p:nvGrpSpPr>
-            <p:cNvPr id="25" name="Group 24">
-              <a:extLst>
-                <a:ext uri="{FF2B5EF4-FFF2-40B4-BE49-F238E27FC236}">
-                  <a16:creationId xmlns:a16="http://schemas.microsoft.com/office/drawing/2014/main" id="{CD755284-1956-4AC0-8517-29383F83D2FA}"/>
-                </a:ext>
-              </a:extLst>
-            </p:cNvPr>
-            <p:cNvGrpSpPr/>
-            <p:nvPr/>
-          </p:nvGrpSpPr>
-          <p:grpSpPr>
-            <a:xfrm>
-              <a:off x="724038" y="950768"/>
-              <a:ext cx="297595" cy="226521"/>
-              <a:chOff x="999190" y="1753985"/>
-              <a:chExt cx="297595" cy="226521"/>
-            </a:xfrm>
-          </p:grpSpPr>
-          <p:sp>
-            <p:nvSpPr>
-              <p:cNvPr id="26" name="Oval 25">
-                <a:extLst>
-                  <a:ext uri="{FF2B5EF4-FFF2-40B4-BE49-F238E27FC236}">
-                    <a16:creationId xmlns:a16="http://schemas.microsoft.com/office/drawing/2014/main" id="{85CA5F95-1177-42A2-BADF-532D8085875F}"/>
-                  </a:ext>
-                </a:extLst>
-              </p:cNvPr>
-              <p:cNvSpPr/>
-              <p:nvPr/>
-            </p:nvSpPr>
-            <p:spPr>
-              <a:xfrm>
-                <a:off x="1122218" y="1753985"/>
-                <a:ext cx="174567" cy="166255"/>
-              </a:xfrm>
-              <a:prstGeom prst="ellipse">
-                <a:avLst/>
-              </a:prstGeom>
-              <a:solidFill>
-                <a:schemeClr val="bg1"/>
-              </a:solidFill>
-              <a:ln>
-                <a:solidFill>
-                  <a:srgbClr val="192857"/>
-                </a:solidFill>
-              </a:ln>
-            </p:spPr>
-            <p:style>
-              <a:lnRef idx="2">
-                <a:schemeClr val="accent1">
-                  <a:shade val="50000"/>
-                </a:schemeClr>
-              </a:lnRef>
-              <a:fillRef idx="1">
-                <a:schemeClr val="accent1"/>
-              </a:fillRef>
-              <a:effectRef idx="0">
-                <a:schemeClr val="accent1"/>
-              </a:effectRef>
-              <a:fontRef idx="minor">
-                <a:schemeClr val="lt1"/>
-              </a:fontRef>
-            </p:style>
-            <p:txBody>
-              <a:bodyPr rtlCol="0" anchor="ctr"/>
-              <a:lstStyle/>
-              <a:p>
-                <a:pPr algn="ctr"/>
-                <a:endParaRPr lang="en-US" dirty="0"/>
-              </a:p>
-            </p:txBody>
-          </p:sp>
-          <p:sp>
-            <p:nvSpPr>
-              <p:cNvPr id="27" name="Rectangle 26">
-                <a:extLst>
-                  <a:ext uri="{FF2B5EF4-FFF2-40B4-BE49-F238E27FC236}">
-                    <a16:creationId xmlns:a16="http://schemas.microsoft.com/office/drawing/2014/main" id="{DAA30100-0158-4B87-AD65-D43A1D146843}"/>
-                  </a:ext>
-                </a:extLst>
-              </p:cNvPr>
-              <p:cNvSpPr/>
-              <p:nvPr/>
-            </p:nvSpPr>
-            <p:spPr>
-              <a:xfrm rot="2802451">
-                <a:off x="1063614" y="1870363"/>
-                <a:ext cx="45719" cy="174567"/>
-              </a:xfrm>
-              <a:prstGeom prst="rect">
-                <a:avLst/>
-              </a:prstGeom>
-              <a:solidFill>
-                <a:srgbClr val="192857"/>
-              </a:solidFill>
-              <a:ln>
-                <a:solidFill>
-                  <a:srgbClr val="192857"/>
-                </a:solidFill>
-              </a:ln>
-            </p:spPr>
-            <p:style>
-              <a:lnRef idx="2">
-                <a:schemeClr val="accent1">
-                  <a:shade val="50000"/>
-                </a:schemeClr>
-              </a:lnRef>
-              <a:fillRef idx="1">
-                <a:schemeClr val="accent1"/>
-              </a:fillRef>
-              <a:effectRef idx="0">
-                <a:schemeClr val="accent1"/>
-              </a:effectRef>
-              <a:fontRef idx="minor">
-                <a:schemeClr val="lt1"/>
-              </a:fontRef>
-            </p:style>
-            <p:txBody>
-              <a:bodyPr rtlCol="0" anchor="ctr"/>
-              <a:lstStyle/>
-              <a:p>
-                <a:pPr algn="ctr"/>
-                <a:endParaRPr lang="en-US"/>
-              </a:p>
-            </p:txBody>
-          </p:sp>
-        </p:grpSp>
-      </p:grpSp>
-      <p:grpSp>
-        <p:nvGrpSpPr>
-          <p:cNvPr id="28" name="Group 27">
-            <a:extLst>
-              <a:ext uri="{FF2B5EF4-FFF2-40B4-BE49-F238E27FC236}">
-                <a16:creationId xmlns:a16="http://schemas.microsoft.com/office/drawing/2014/main" id="{2D919CE0-4280-4820-8931-B100820F6F11}"/>
-              </a:ext>
-            </a:extLst>
-          </p:cNvPr>
-          <p:cNvGrpSpPr/>
-          <p:nvPr/>
-        </p:nvGrpSpPr>
-        <p:grpSpPr>
-          <a:xfrm>
-            <a:off x="9350027" y="0"/>
-            <a:ext cx="2163816" cy="799674"/>
-            <a:chOff x="9040573" y="-17327"/>
-            <a:chExt cx="2163816" cy="799674"/>
-          </a:xfrm>
-        </p:grpSpPr>
-        <p:sp>
-          <p:nvSpPr>
-            <p:cNvPr id="29" name="Rectangle: Rounded Corners 28">
-              <a:extLst>
-                <a:ext uri="{FF2B5EF4-FFF2-40B4-BE49-F238E27FC236}">
-                  <a16:creationId xmlns:a16="http://schemas.microsoft.com/office/drawing/2014/main" id="{5170EB4E-77A9-479C-A249-753F9BE836BE}"/>
-                </a:ext>
-              </a:extLst>
-            </p:cNvPr>
-            <p:cNvSpPr/>
-            <p:nvPr/>
-          </p:nvSpPr>
-          <p:spPr>
-            <a:xfrm>
-              <a:off x="9445569" y="-17327"/>
-              <a:ext cx="1758820" cy="633147"/>
-            </a:xfrm>
-            <a:prstGeom prst="roundRect">
-              <a:avLst/>
-            </a:prstGeom>
-            <a:solidFill>
-              <a:srgbClr val="192857"/>
-            </a:solidFill>
-            <a:ln w="25400">
-              <a:solidFill>
-                <a:srgbClr val="BFA458"/>
-              </a:solidFill>
-            </a:ln>
-          </p:spPr>
-          <p:style>
-            <a:lnRef idx="2">
-              <a:schemeClr val="accent1">
-                <a:shade val="50000"/>
-              </a:schemeClr>
-            </a:lnRef>
-            <a:fillRef idx="1">
-              <a:schemeClr val="accent1"/>
-            </a:fillRef>
-            <a:effectRef idx="0">
-              <a:schemeClr val="accent1"/>
-            </a:effectRef>
-            <a:fontRef idx="minor">
-              <a:schemeClr val="lt1"/>
-            </a:fontRef>
-          </p:style>
-          <p:txBody>
-            <a:bodyPr rtlCol="0" anchor="ctr"/>
-            <a:lstStyle/>
-            <a:p>
-              <a:pPr algn="ctr"/>
-              <a:endParaRPr lang="en-US" sz="1400" dirty="0">
-                <a:solidFill>
-                  <a:srgbClr val="BFA458"/>
-                </a:solidFill>
-                <a:latin typeface="Arial Black" panose="020B0A04020102020204" pitchFamily="34" charset="0"/>
-                <a:cs typeface="Aharoni" panose="02010803020104030203" pitchFamily="2" charset="-79"/>
-              </a:endParaRPr>
-            </a:p>
-          </p:txBody>
-        </p:sp>
-        <p:sp>
-          <p:nvSpPr>
-            <p:cNvPr id="30" name="TextBox 29">
-              <a:extLst>
-                <a:ext uri="{FF2B5EF4-FFF2-40B4-BE49-F238E27FC236}">
-                  <a16:creationId xmlns:a16="http://schemas.microsoft.com/office/drawing/2014/main" id="{AD82761D-99B2-474D-B14C-1A6DD64D6D2C}"/>
-                </a:ext>
-              </a:extLst>
-            </p:cNvPr>
-            <p:cNvSpPr txBox="1"/>
-            <p:nvPr/>
-          </p:nvSpPr>
-          <p:spPr>
-            <a:xfrm>
-              <a:off x="9040573" y="43683"/>
-              <a:ext cx="1998300" cy="738664"/>
-            </a:xfrm>
-            <a:prstGeom prst="rect">
-              <a:avLst/>
-            </a:prstGeom>
-            <a:noFill/>
-          </p:spPr>
-          <p:txBody>
-            <a:bodyPr wrap="square" rtlCol="0">
-              <a:spAutoFit/>
-            </a:bodyPr>
-            <a:lstStyle/>
-            <a:p>
-              <a:pPr algn="ctr"/>
-              <a:r>
-                <a:rPr lang="en-US" sz="1400" dirty="0">
-                  <a:solidFill>
-                    <a:srgbClr val="BFA458"/>
-                  </a:solidFill>
-                  <a:latin typeface="Arial Black" panose="020B0A04020102020204" pitchFamily="34" charset="0"/>
-                  <a:cs typeface="Aharoni" panose="02010803020104030203" pitchFamily="2" charset="-79"/>
-                </a:rPr>
-                <a:t>User1234</a:t>
-              </a:r>
-            </a:p>
-            <a:p>
-              <a:pPr algn="ctr"/>
-              <a:r>
-                <a:rPr lang="en-US" sz="1400" dirty="0">
-                  <a:solidFill>
-                    <a:srgbClr val="BFA458"/>
-                  </a:solidFill>
-                  <a:latin typeface="Arial Black" panose="020B0A04020102020204" pitchFamily="34" charset="0"/>
-                  <a:cs typeface="Aharoni" panose="02010803020104030203" pitchFamily="2" charset="-79"/>
-                </a:rPr>
-                <a:t>Profile</a:t>
-              </a:r>
-            </a:p>
-            <a:p>
-              <a:endParaRPr lang="en-US" sz="1400" dirty="0"/>
-            </a:p>
-          </p:txBody>
-        </p:sp>
-        <p:sp>
-          <p:nvSpPr>
-            <p:cNvPr id="31" name="Isosceles Triangle 30">
-              <a:extLst>
-                <a:ext uri="{FF2B5EF4-FFF2-40B4-BE49-F238E27FC236}">
-                  <a16:creationId xmlns:a16="http://schemas.microsoft.com/office/drawing/2014/main" id="{B4F8DF81-4539-4E9D-ABE3-5494D253C703}"/>
-                </a:ext>
-              </a:extLst>
-            </p:cNvPr>
-            <p:cNvSpPr/>
-            <p:nvPr/>
-          </p:nvSpPr>
-          <p:spPr>
-            <a:xfrm rot="10800000">
-              <a:off x="10674980" y="173952"/>
-              <a:ext cx="363893" cy="251926"/>
-            </a:xfrm>
-            <a:prstGeom prst="triangle">
-              <a:avLst/>
-            </a:prstGeom>
-            <a:solidFill>
-              <a:srgbClr val="BFA458"/>
-            </a:solidFill>
-            <a:ln w="12700">
-              <a:solidFill>
-                <a:schemeClr val="bg1"/>
-              </a:solidFill>
-            </a:ln>
-          </p:spPr>
-          <p:style>
-            <a:lnRef idx="2">
-              <a:schemeClr val="accent1">
-                <a:shade val="50000"/>
-              </a:schemeClr>
-            </a:lnRef>
-            <a:fillRef idx="1">
-              <a:schemeClr val="accent1"/>
-            </a:fillRef>
-            <a:effectRef idx="0">
-              <a:schemeClr val="accent1"/>
-            </a:effectRef>
-            <a:fontRef idx="minor">
-              <a:schemeClr val="lt1"/>
-            </a:fontRef>
-          </p:style>
-          <p:txBody>
-            <a:bodyPr rtlCol="0" anchor="ctr"/>
-            <a:lstStyle/>
-            <a:p>
-              <a:pPr algn="ctr"/>
-              <a:endParaRPr lang="en-US"/>
-            </a:p>
-          </p:txBody>
-        </p:sp>
-      </p:grpSp>
-      <p:sp>
-        <p:nvSpPr>
-          <p:cNvPr id="32" name="Rectangle: Rounded Corners 31">
-            <a:extLst>
-              <a:ext uri="{FF2B5EF4-FFF2-40B4-BE49-F238E27FC236}">
-                <a16:creationId xmlns:a16="http://schemas.microsoft.com/office/drawing/2014/main" id="{3145EB56-BEC0-4EBA-A15B-517AB8D59176}"/>
-              </a:ext>
-            </a:extLst>
-          </p:cNvPr>
-          <p:cNvSpPr/>
-          <p:nvPr/>
-        </p:nvSpPr>
-        <p:spPr>
-          <a:xfrm>
-            <a:off x="5846450" y="-9699"/>
-            <a:ext cx="1758820" cy="633147"/>
-          </a:xfrm>
-          <a:prstGeom prst="roundRect">
-            <a:avLst/>
-          </a:prstGeom>
-          <a:solidFill>
-            <a:srgbClr val="192857"/>
-          </a:solidFill>
-          <a:ln w="25400">
-            <a:solidFill>
-              <a:srgbClr val="BFA458"/>
-            </a:solidFill>
-          </a:ln>
-        </p:spPr>
-        <p:style>
-          <a:lnRef idx="2">
-            <a:schemeClr val="accent1">
-              <a:shade val="50000"/>
-            </a:schemeClr>
-          </a:lnRef>
-          <a:fillRef idx="1">
-            <a:schemeClr val="accent1"/>
-          </a:fillRef>
-          <a:effectRef idx="0">
-            <a:schemeClr val="accent1"/>
-          </a:effectRef>
-          <a:fontRef idx="minor">
-            <a:schemeClr val="lt1"/>
-          </a:fontRef>
-        </p:style>
-        <p:txBody>
-          <a:bodyPr rtlCol="0" anchor="ctr"/>
-          <a:lstStyle/>
-          <a:p>
-            <a:pPr algn="ctr"/>
-            <a:r>
-              <a:rPr lang="en-US" sz="1400" dirty="0">
-                <a:solidFill>
-                  <a:srgbClr val="BFA458"/>
-                </a:solidFill>
-                <a:latin typeface="Arial Black" panose="020B0A04020102020204" pitchFamily="34" charset="0"/>
-                <a:cs typeface="Aharoni" panose="02010803020104030203" pitchFamily="2" charset="-79"/>
-              </a:rPr>
-              <a:t>Filter Your Search!</a:t>
-            </a:r>
-          </a:p>
-        </p:txBody>
-      </p:sp>
-      <p:sp>
-        <p:nvSpPr>
-          <p:cNvPr id="33" name="Rectangle: Rounded Corners 32">
-            <a:extLst>
-              <a:ext uri="{FF2B5EF4-FFF2-40B4-BE49-F238E27FC236}">
-                <a16:creationId xmlns:a16="http://schemas.microsoft.com/office/drawing/2014/main" id="{C36757AB-B7AF-4781-B8C0-841E1EA3ACD8}"/>
-              </a:ext>
-            </a:extLst>
-          </p:cNvPr>
-          <p:cNvSpPr/>
-          <p:nvPr/>
-        </p:nvSpPr>
-        <p:spPr>
-          <a:xfrm>
-            <a:off x="7830687" y="0"/>
-            <a:ext cx="1758820" cy="633147"/>
-          </a:xfrm>
-          <a:prstGeom prst="roundRect">
-            <a:avLst/>
-          </a:prstGeom>
-          <a:solidFill>
-            <a:srgbClr val="192857"/>
-          </a:solidFill>
-          <a:ln w="25400">
-            <a:solidFill>
-              <a:srgbClr val="BFA458"/>
-            </a:solidFill>
-          </a:ln>
-        </p:spPr>
-        <p:style>
-          <a:lnRef idx="2">
-            <a:schemeClr val="accent1">
-              <a:shade val="50000"/>
-            </a:schemeClr>
-          </a:lnRef>
-          <a:fillRef idx="1">
-            <a:schemeClr val="accent1"/>
-          </a:fillRef>
-          <a:effectRef idx="0">
-            <a:schemeClr val="accent1"/>
-          </a:effectRef>
-          <a:fontRef idx="minor">
-            <a:schemeClr val="lt1"/>
-          </a:fontRef>
-        </p:style>
-        <p:txBody>
-          <a:bodyPr rtlCol="0" anchor="ctr"/>
-          <a:lstStyle/>
-          <a:p>
-            <a:pPr algn="ctr"/>
-            <a:r>
-              <a:rPr lang="en-US" sz="1400" dirty="0">
-                <a:solidFill>
-                  <a:srgbClr val="BFA458"/>
-                </a:solidFill>
-                <a:latin typeface="Arial Black" panose="020B0A04020102020204" pitchFamily="34" charset="0"/>
-              </a:rPr>
-              <a:t>Create a Posting!</a:t>
-            </a:r>
-          </a:p>
-        </p:txBody>
-      </p:sp>
-      <p:grpSp>
-        <p:nvGrpSpPr>
-          <p:cNvPr id="34" name="Group 33">
-            <a:extLst>
-              <a:ext uri="{FF2B5EF4-FFF2-40B4-BE49-F238E27FC236}">
-                <a16:creationId xmlns:a16="http://schemas.microsoft.com/office/drawing/2014/main" id="{12DF5CAD-F261-41BD-8AA4-1FC114FC24D3}"/>
-              </a:ext>
-            </a:extLst>
-          </p:cNvPr>
-          <p:cNvGrpSpPr/>
-          <p:nvPr/>
-        </p:nvGrpSpPr>
-        <p:grpSpPr>
-          <a:xfrm>
-            <a:off x="355499" y="0"/>
-            <a:ext cx="1498313" cy="633147"/>
-            <a:chOff x="843672" y="540620"/>
-            <a:chExt cx="1498313" cy="633147"/>
-          </a:xfrm>
-        </p:grpSpPr>
-        <p:sp>
-          <p:nvSpPr>
-            <p:cNvPr id="35" name="TextBox 34">
-              <a:extLst>
-                <a:ext uri="{FF2B5EF4-FFF2-40B4-BE49-F238E27FC236}">
-                  <a16:creationId xmlns:a16="http://schemas.microsoft.com/office/drawing/2014/main" id="{A4907329-A7FC-4419-983B-67679B45FA3F}"/>
-                </a:ext>
-              </a:extLst>
-            </p:cNvPr>
-            <p:cNvSpPr txBox="1"/>
-            <p:nvPr/>
-          </p:nvSpPr>
-          <p:spPr>
-            <a:xfrm>
-              <a:off x="1257373" y="662767"/>
-              <a:ext cx="1004299" cy="369332"/>
-            </a:xfrm>
-            <a:prstGeom prst="rect">
-              <a:avLst/>
-            </a:prstGeom>
-            <a:noFill/>
-          </p:spPr>
-          <p:txBody>
-            <a:bodyPr wrap="square" rtlCol="0">
-              <a:spAutoFit/>
-            </a:bodyPr>
-            <a:lstStyle/>
-            <a:p>
-              <a:r>
-                <a:rPr lang="en-US" dirty="0">
-                  <a:solidFill>
-                    <a:srgbClr val="BFA458"/>
-                  </a:solidFill>
-                  <a:latin typeface="Arial Black" panose="020B0A04020102020204" pitchFamily="34" charset="0"/>
-                  <a:cs typeface="Aharoni" panose="02010803020104030203" pitchFamily="2" charset="-79"/>
-                </a:rPr>
-                <a:t>HOME</a:t>
-              </a:r>
-            </a:p>
-          </p:txBody>
-        </p:sp>
-        <p:pic>
-          <p:nvPicPr>
-            <p:cNvPr id="36" name="Graphic 35" descr="House">
-              <a:extLst>
-                <a:ext uri="{FF2B5EF4-FFF2-40B4-BE49-F238E27FC236}">
-                  <a16:creationId xmlns:a16="http://schemas.microsoft.com/office/drawing/2014/main" id="{F2E195F9-2930-44A7-8C65-82D9C65370AE}"/>
-                </a:ext>
-              </a:extLst>
-            </p:cNvPr>
-            <p:cNvPicPr>
-              <a:picLocks noChangeAspect="1"/>
-            </p:cNvPicPr>
-            <p:nvPr/>
-          </p:nvPicPr>
-          <p:blipFill>
-            <a:blip r:embed="rId2">
-              <a:extLst>
-                <a:ext uri="{28A0092B-C50C-407E-A947-70E740481C1C}">
-                  <a14:useLocalDpi xmlns:a14="http://schemas.microsoft.com/office/drawing/2010/main" val="0"/>
-                </a:ext>
-                <a:ext uri="{96DAC541-7B7A-43D3-8B79-37D633B846F1}">
-                  <asvg:svgBlip xmlns:asvg="http://schemas.microsoft.com/office/drawing/2016/SVG/main" r:embed="rId3"/>
-                </a:ext>
-              </a:extLst>
-            </a:blip>
-            <a:stretch>
-              <a:fillRect/>
-            </a:stretch>
-          </p:blipFill>
-          <p:spPr>
-            <a:xfrm>
-              <a:off x="904863" y="650049"/>
-              <a:ext cx="369332" cy="369332"/>
-            </a:xfrm>
-            <a:prstGeom prst="rect">
-              <a:avLst/>
-            </a:prstGeom>
-          </p:spPr>
-        </p:pic>
-        <p:sp>
-          <p:nvSpPr>
-            <p:cNvPr id="37" name="Rectangle: Rounded Corners 36">
-              <a:extLst>
-                <a:ext uri="{FF2B5EF4-FFF2-40B4-BE49-F238E27FC236}">
-                  <a16:creationId xmlns:a16="http://schemas.microsoft.com/office/drawing/2014/main" id="{71B8BDF9-1C03-4D0D-AAB8-F9E59ED4CB28}"/>
-                </a:ext>
-              </a:extLst>
-            </p:cNvPr>
-            <p:cNvSpPr/>
-            <p:nvPr/>
-          </p:nvSpPr>
-          <p:spPr>
-            <a:xfrm>
-              <a:off x="843672" y="540620"/>
-              <a:ext cx="1498313" cy="633147"/>
-            </a:xfrm>
-            <a:prstGeom prst="roundRect">
-              <a:avLst/>
-            </a:prstGeom>
-            <a:noFill/>
-            <a:ln w="25400">
-              <a:solidFill>
-                <a:srgbClr val="BFA458"/>
-              </a:solidFill>
-            </a:ln>
-          </p:spPr>
-          <p:style>
-            <a:lnRef idx="2">
-              <a:schemeClr val="accent1">
-                <a:shade val="50000"/>
-              </a:schemeClr>
-            </a:lnRef>
-            <a:fillRef idx="1">
-              <a:schemeClr val="accent1"/>
-            </a:fillRef>
-            <a:effectRef idx="0">
-              <a:schemeClr val="accent1"/>
-            </a:effectRef>
-            <a:fontRef idx="minor">
-              <a:schemeClr val="lt1"/>
-            </a:fontRef>
-          </p:style>
-          <p:txBody>
-            <a:bodyPr rtlCol="0" anchor="ctr"/>
-            <a:lstStyle/>
-            <a:p>
-              <a:pPr algn="ctr"/>
-              <a:endParaRPr lang="en-US" sz="1400" dirty="0">
-                <a:solidFill>
-                  <a:srgbClr val="BFA458"/>
-                </a:solidFill>
-                <a:latin typeface="Arial Black" panose="020B0A04020102020204" pitchFamily="34" charset="0"/>
-                <a:cs typeface="Aharoni" panose="02010803020104030203" pitchFamily="2" charset="-79"/>
-              </a:endParaRPr>
-            </a:p>
-          </p:txBody>
-        </p:sp>
-      </p:grpSp>
-      <p:sp>
-        <p:nvSpPr>
-          <p:cNvPr id="39" name="Rectangle 38">
-            <a:extLst>
-              <a:ext uri="{FF2B5EF4-FFF2-40B4-BE49-F238E27FC236}">
-                <a16:creationId xmlns:a16="http://schemas.microsoft.com/office/drawing/2014/main" id="{5ED8E4AF-EA0E-4482-A7F5-E8E190A83288}"/>
-              </a:ext>
-            </a:extLst>
-          </p:cNvPr>
-          <p:cNvSpPr/>
-          <p:nvPr/>
-        </p:nvSpPr>
-        <p:spPr>
-          <a:xfrm>
-            <a:off x="355499" y="905069"/>
-            <a:ext cx="11541032" cy="5952931"/>
+            <a:off x="355498" y="868681"/>
+            <a:ext cx="11658600" cy="5989319"/>
           </a:xfrm>
           <a:prstGeom prst="rect">
             <a:avLst/>
@@ -7505,7 +6824,105 @@
             <a:solidFill>
               <a:srgbClr val="192857"/>
             </a:solidFill>
+            <a:extLst>
+              <a:ext uri="{C807C97D-BFC1-408E-A445-0C87EB9F89A2}">
+                <ask:lineSketchStyleProps xmlns:ask="http://schemas.microsoft.com/office/drawing/2018/sketchyshapes" sd="1219033472">
+                  <a:custGeom>
+                    <a:avLst/>
+                    <a:gdLst>
+                      <a:gd name="connsiteX0" fmla="*/ 0 w 11541032"/>
+                      <a:gd name="connsiteY0" fmla="*/ 0 h 5952931"/>
+                      <a:gd name="connsiteX1" fmla="*/ 11541032 w 11541032"/>
+                      <a:gd name="connsiteY1" fmla="*/ 0 h 5952931"/>
+                      <a:gd name="connsiteX2" fmla="*/ 11541032 w 11541032"/>
+                      <a:gd name="connsiteY2" fmla="*/ 5952931 h 5952931"/>
+                      <a:gd name="connsiteX3" fmla="*/ 0 w 11541032"/>
+                      <a:gd name="connsiteY3" fmla="*/ 5952931 h 5952931"/>
+                      <a:gd name="connsiteX4" fmla="*/ 0 w 11541032"/>
+                      <a:gd name="connsiteY4" fmla="*/ 0 h 5952931"/>
+                    </a:gdLst>
+                    <a:ahLst/>
+                    <a:cxnLst>
+                      <a:cxn ang="0">
+                        <a:pos x="connsiteX0" y="connsiteY0"/>
+                      </a:cxn>
+                      <a:cxn ang="0">
+                        <a:pos x="connsiteX1" y="connsiteY1"/>
+                      </a:cxn>
+                      <a:cxn ang="0">
+                        <a:pos x="connsiteX2" y="connsiteY2"/>
+                      </a:cxn>
+                      <a:cxn ang="0">
+                        <a:pos x="connsiteX3" y="connsiteY3"/>
+                      </a:cxn>
+                      <a:cxn ang="0">
+                        <a:pos x="connsiteX4" y="connsiteY4"/>
+                      </a:cxn>
+                    </a:cxnLst>
+                    <a:rect l="l" t="t" r="r" b="b"/>
+                    <a:pathLst>
+                      <a:path w="11541032" h="5952931" fill="none" extrusionOk="0">
+                        <a:moveTo>
+                          <a:pt x="0" y="0"/>
+                        </a:moveTo>
+                        <a:cubicBezTo>
+                          <a:pt x="1549575" y="-49533"/>
+                          <a:pt x="6641909" y="-14809"/>
+                          <a:pt x="11541032" y="0"/>
+                        </a:cubicBezTo>
+                        <a:cubicBezTo>
+                          <a:pt x="11628671" y="1655164"/>
+                          <a:pt x="11468353" y="4293766"/>
+                          <a:pt x="11541032" y="5952931"/>
+                        </a:cubicBezTo>
+                        <a:cubicBezTo>
+                          <a:pt x="5873019" y="5904700"/>
+                          <a:pt x="5333643" y="6037386"/>
+                          <a:pt x="0" y="5952931"/>
+                        </a:cubicBezTo>
+                        <a:cubicBezTo>
+                          <a:pt x="-38581" y="3544248"/>
+                          <a:pt x="63341" y="1302582"/>
+                          <a:pt x="0" y="0"/>
+                        </a:cubicBezTo>
+                        <a:close/>
+                      </a:path>
+                      <a:path w="11541032" h="5952931" stroke="0" extrusionOk="0">
+                        <a:moveTo>
+                          <a:pt x="0" y="0"/>
+                        </a:moveTo>
+                        <a:cubicBezTo>
+                          <a:pt x="1892056" y="118645"/>
+                          <a:pt x="7387287" y="116012"/>
+                          <a:pt x="11541032" y="0"/>
+                        </a:cubicBezTo>
+                        <a:cubicBezTo>
+                          <a:pt x="11408150" y="2935766"/>
+                          <a:pt x="11625983" y="3542959"/>
+                          <a:pt x="11541032" y="5952931"/>
+                        </a:cubicBezTo>
+                        <a:cubicBezTo>
+                          <a:pt x="8071700" y="6087531"/>
+                          <a:pt x="3874238" y="5795735"/>
+                          <a:pt x="0" y="5952931"/>
+                        </a:cubicBezTo>
+                        <a:cubicBezTo>
+                          <a:pt x="-20187" y="3141024"/>
+                          <a:pt x="-152480" y="602658"/>
+                          <a:pt x="0" y="0"/>
+                        </a:cubicBezTo>
+                        <a:close/>
+                      </a:path>
+                    </a:pathLst>
+                  </a:custGeom>
+                  <ask:type>
+                    <ask:lineSketchNone/>
+                  </ask:type>
+                </ask:lineSketchStyleProps>
+              </a:ext>
+            </a:extLst>
           </a:ln>
+          <a:effectLst/>
         </p:spPr>
         <p:style>
           <a:lnRef idx="2">
@@ -7766,8 +7183,7 @@
           <a:bodyPr rtlCol="0" anchor="ctr"/>
           <a:lstStyle/>
           <a:p>
-            <a:pPr algn="ctr"/>
-            <a:endParaRPr lang="en-US"/>
+            <a:endParaRPr lang="en-US" dirty="0"/>
           </a:p>
         </p:txBody>
       </p:sp>
@@ -8409,7 +7825,7 @@
             <a:avLst/>
           </a:prstGeom>
           <a:solidFill>
-            <a:srgbClr val="192857"/>
+            <a:srgbClr val="BFA458"/>
           </a:solidFill>
           <a:ln w="25400">
             <a:solidFill>
@@ -8549,13 +7965,13 @@
           <p:nvPr/>
         </p:nvPicPr>
         <p:blipFill>
-          <a:blip r:embed="rId4">
+          <a:blip r:embed="rId2">
             <a:extLst>
               <a:ext uri="{28A0092B-C50C-407E-A947-70E740481C1C}">
                 <a14:useLocalDpi xmlns:a14="http://schemas.microsoft.com/office/drawing/2010/main" val="0"/>
               </a:ext>
               <a:ext uri="{96DAC541-7B7A-43D3-8B79-37D633B846F1}">
-                <asvg:svgBlip xmlns:asvg="http://schemas.microsoft.com/office/drawing/2016/SVG/main" r:embed="rId5"/>
+                <asvg:svgBlip xmlns:asvg="http://schemas.microsoft.com/office/drawing/2016/SVG/main" r:embed="rId3"/>
               </a:ext>
             </a:extLst>
           </a:blip>
@@ -8565,8 +7981,8 @@
         </p:blipFill>
         <p:spPr>
           <a:xfrm>
-            <a:off x="772317" y="6128928"/>
-            <a:ext cx="213012" cy="213012"/>
+            <a:off x="788319" y="6139022"/>
+            <a:ext cx="195739" cy="195739"/>
           </a:xfrm>
           <a:prstGeom prst="rect">
             <a:avLst/>
@@ -8716,13 +8132,15 @@
         </p:nvSpPr>
         <p:spPr>
           <a:xfrm>
-            <a:off x="9834825" y="4564210"/>
+            <a:off x="9652760" y="4243757"/>
             <a:ext cx="1553113" cy="954107"/>
           </a:xfrm>
           <a:prstGeom prst="rect">
             <a:avLst/>
           </a:prstGeom>
-          <a:noFill/>
+          <a:solidFill>
+            <a:srgbClr val="FFFF00"/>
+          </a:solidFill>
         </p:spPr>
         <p:txBody>
           <a:bodyPr wrap="square" rtlCol="0">
@@ -8741,6 +8159,995 @@
           </a:p>
         </p:txBody>
       </p:sp>
+      <p:grpSp>
+        <p:nvGrpSpPr>
+          <p:cNvPr id="52" name="Group 51">
+            <a:extLst>
+              <a:ext uri="{FF2B5EF4-FFF2-40B4-BE49-F238E27FC236}">
+                <a16:creationId xmlns:a16="http://schemas.microsoft.com/office/drawing/2014/main" id="{D368AB9E-02AE-4078-B214-42B942506F68}"/>
+              </a:ext>
+            </a:extLst>
+          </p:cNvPr>
+          <p:cNvGrpSpPr/>
+          <p:nvPr/>
+        </p:nvGrpSpPr>
+        <p:grpSpPr>
+          <a:xfrm>
+            <a:off x="0" y="-5519"/>
+            <a:ext cx="12192000" cy="644184"/>
+            <a:chOff x="0" y="-5519"/>
+            <a:chExt cx="12192000" cy="644184"/>
+          </a:xfrm>
+        </p:grpSpPr>
+        <p:sp>
+          <p:nvSpPr>
+            <p:cNvPr id="54" name="Rectangle 53">
+              <a:extLst>
+                <a:ext uri="{FF2B5EF4-FFF2-40B4-BE49-F238E27FC236}">
+                  <a16:creationId xmlns:a16="http://schemas.microsoft.com/office/drawing/2014/main" id="{BA4F1519-5E19-4D3E-8AC7-B9F940282442}"/>
+                </a:ext>
+              </a:extLst>
+            </p:cNvPr>
+            <p:cNvSpPr/>
+            <p:nvPr/>
+          </p:nvSpPr>
+          <p:spPr>
+            <a:xfrm>
+              <a:off x="0" y="-5518"/>
+              <a:ext cx="12192000" cy="638665"/>
+            </a:xfrm>
+            <a:prstGeom prst="rect">
+              <a:avLst/>
+            </a:prstGeom>
+            <a:solidFill>
+              <a:srgbClr val="192857"/>
+            </a:solidFill>
+          </p:spPr>
+          <p:style>
+            <a:lnRef idx="2">
+              <a:schemeClr val="accent1">
+                <a:shade val="50000"/>
+              </a:schemeClr>
+            </a:lnRef>
+            <a:fillRef idx="1">
+              <a:schemeClr val="accent1"/>
+            </a:fillRef>
+            <a:effectRef idx="0">
+              <a:schemeClr val="accent1"/>
+            </a:effectRef>
+            <a:fontRef idx="minor">
+              <a:schemeClr val="lt1"/>
+            </a:fontRef>
+          </p:style>
+          <p:txBody>
+            <a:bodyPr rtlCol="0" anchor="ctr"/>
+            <a:lstStyle/>
+            <a:p>
+              <a:pPr algn="ctr"/>
+              <a:endParaRPr lang="en-US" dirty="0"/>
+            </a:p>
+          </p:txBody>
+        </p:sp>
+        <p:grpSp>
+          <p:nvGrpSpPr>
+            <p:cNvPr id="56" name="Group 55">
+              <a:extLst>
+                <a:ext uri="{FF2B5EF4-FFF2-40B4-BE49-F238E27FC236}">
+                  <a16:creationId xmlns:a16="http://schemas.microsoft.com/office/drawing/2014/main" id="{263A828D-92C2-45ED-B152-4E1658D1C1DB}"/>
+                </a:ext>
+              </a:extLst>
+            </p:cNvPr>
+            <p:cNvGrpSpPr/>
+            <p:nvPr/>
+          </p:nvGrpSpPr>
+          <p:grpSpPr>
+            <a:xfrm>
+              <a:off x="2023927" y="97421"/>
+              <a:ext cx="3028757" cy="378073"/>
+              <a:chOff x="3427615" y="123834"/>
+              <a:chExt cx="2668385" cy="378073"/>
+            </a:xfrm>
+          </p:grpSpPr>
+          <p:sp>
+            <p:nvSpPr>
+              <p:cNvPr id="86" name="Rectangle: Rounded Corners 85">
+                <a:extLst>
+                  <a:ext uri="{FF2B5EF4-FFF2-40B4-BE49-F238E27FC236}">
+                    <a16:creationId xmlns:a16="http://schemas.microsoft.com/office/drawing/2014/main" id="{2BAA49D3-B94A-4E42-9A6C-C3C9DFB5F099}"/>
+                  </a:ext>
+                </a:extLst>
+              </p:cNvPr>
+              <p:cNvSpPr/>
+              <p:nvPr/>
+            </p:nvSpPr>
+            <p:spPr>
+              <a:xfrm>
+                <a:off x="3427615" y="132575"/>
+                <a:ext cx="2668385" cy="369332"/>
+              </a:xfrm>
+              <a:prstGeom prst="roundRect">
+                <a:avLst/>
+              </a:prstGeom>
+              <a:solidFill>
+                <a:srgbClr val="F2F2F2"/>
+              </a:solidFill>
+            </p:spPr>
+            <p:style>
+              <a:lnRef idx="2">
+                <a:schemeClr val="accent1">
+                  <a:shade val="50000"/>
+                </a:schemeClr>
+              </a:lnRef>
+              <a:fillRef idx="1">
+                <a:schemeClr val="accent1"/>
+              </a:fillRef>
+              <a:effectRef idx="0">
+                <a:schemeClr val="accent1"/>
+              </a:effectRef>
+              <a:fontRef idx="minor">
+                <a:schemeClr val="lt1"/>
+              </a:fontRef>
+            </p:style>
+            <p:txBody>
+              <a:bodyPr rtlCol="0" anchor="ctr"/>
+              <a:lstStyle/>
+              <a:p>
+                <a:pPr algn="ctr"/>
+                <a:endParaRPr lang="en-US"/>
+              </a:p>
+            </p:txBody>
+          </p:sp>
+          <p:sp>
+            <p:nvSpPr>
+              <p:cNvPr id="87" name="TextBox 86">
+                <a:extLst>
+                  <a:ext uri="{FF2B5EF4-FFF2-40B4-BE49-F238E27FC236}">
+                    <a16:creationId xmlns:a16="http://schemas.microsoft.com/office/drawing/2014/main" id="{5E7FAC00-DA42-465B-B4D2-7F496A12DE90}"/>
+                  </a:ext>
+                </a:extLst>
+              </p:cNvPr>
+              <p:cNvSpPr txBox="1"/>
+              <p:nvPr/>
+            </p:nvSpPr>
+            <p:spPr>
+              <a:xfrm>
+                <a:off x="3427615" y="123834"/>
+                <a:ext cx="2402378" cy="369332"/>
+              </a:xfrm>
+              <a:prstGeom prst="rect">
+                <a:avLst/>
+              </a:prstGeom>
+              <a:noFill/>
+            </p:spPr>
+            <p:txBody>
+              <a:bodyPr wrap="square" rtlCol="0">
+                <a:spAutoFit/>
+              </a:bodyPr>
+              <a:lstStyle/>
+              <a:p>
+                <a:r>
+                  <a:rPr lang="en-US" dirty="0">
+                    <a:solidFill>
+                      <a:schemeClr val="bg2">
+                        <a:lumMod val="50000"/>
+                      </a:schemeClr>
+                    </a:solidFill>
+                  </a:rPr>
+                  <a:t>Quick Search…</a:t>
+                </a:r>
+              </a:p>
+            </p:txBody>
+          </p:sp>
+        </p:grpSp>
+        <p:grpSp>
+          <p:nvGrpSpPr>
+            <p:cNvPr id="65" name="Group 64">
+              <a:extLst>
+                <a:ext uri="{FF2B5EF4-FFF2-40B4-BE49-F238E27FC236}">
+                  <a16:creationId xmlns:a16="http://schemas.microsoft.com/office/drawing/2014/main" id="{F5F298DA-F36E-4AA2-8928-779A325D6657}"/>
+                </a:ext>
+              </a:extLst>
+            </p:cNvPr>
+            <p:cNvGrpSpPr/>
+            <p:nvPr/>
+          </p:nvGrpSpPr>
+          <p:grpSpPr>
+            <a:xfrm>
+              <a:off x="5204451" y="125253"/>
+              <a:ext cx="365760" cy="299258"/>
+              <a:chOff x="623455" y="856211"/>
+              <a:chExt cx="498763" cy="415636"/>
+            </a:xfrm>
+          </p:grpSpPr>
+          <p:sp>
+            <p:nvSpPr>
+              <p:cNvPr id="82" name="Rectangle: Rounded Corners 81">
+                <a:extLst>
+                  <a:ext uri="{FF2B5EF4-FFF2-40B4-BE49-F238E27FC236}">
+                    <a16:creationId xmlns:a16="http://schemas.microsoft.com/office/drawing/2014/main" id="{328BE1DC-2ABB-4F82-BF81-3E468CEABB61}"/>
+                  </a:ext>
+                </a:extLst>
+              </p:cNvPr>
+              <p:cNvSpPr/>
+              <p:nvPr/>
+            </p:nvSpPr>
+            <p:spPr>
+              <a:xfrm>
+                <a:off x="623455" y="856211"/>
+                <a:ext cx="498763" cy="415636"/>
+              </a:xfrm>
+              <a:prstGeom prst="roundRect">
+                <a:avLst/>
+              </a:prstGeom>
+              <a:solidFill>
+                <a:srgbClr val="BFA458"/>
+              </a:solidFill>
+            </p:spPr>
+            <p:style>
+              <a:lnRef idx="2">
+                <a:schemeClr val="accent1">
+                  <a:shade val="50000"/>
+                </a:schemeClr>
+              </a:lnRef>
+              <a:fillRef idx="1">
+                <a:schemeClr val="accent1"/>
+              </a:fillRef>
+              <a:effectRef idx="0">
+                <a:schemeClr val="accent1"/>
+              </a:effectRef>
+              <a:fontRef idx="minor">
+                <a:schemeClr val="lt1"/>
+              </a:fontRef>
+            </p:style>
+            <p:txBody>
+              <a:bodyPr rtlCol="0" anchor="ctr"/>
+              <a:lstStyle/>
+              <a:p>
+                <a:pPr algn="ctr"/>
+                <a:endParaRPr lang="en-US"/>
+              </a:p>
+            </p:txBody>
+          </p:sp>
+          <p:grpSp>
+            <p:nvGrpSpPr>
+              <p:cNvPr id="83" name="Group 82">
+                <a:extLst>
+                  <a:ext uri="{FF2B5EF4-FFF2-40B4-BE49-F238E27FC236}">
+                    <a16:creationId xmlns:a16="http://schemas.microsoft.com/office/drawing/2014/main" id="{550DA8E9-CF99-44DF-B6FD-5CEECA0AE8C0}"/>
+                  </a:ext>
+                </a:extLst>
+              </p:cNvPr>
+              <p:cNvGrpSpPr/>
+              <p:nvPr/>
+            </p:nvGrpSpPr>
+            <p:grpSpPr>
+              <a:xfrm>
+                <a:off x="724038" y="950768"/>
+                <a:ext cx="297595" cy="226521"/>
+                <a:chOff x="999190" y="1753985"/>
+                <a:chExt cx="297595" cy="226521"/>
+              </a:xfrm>
+            </p:grpSpPr>
+            <p:sp>
+              <p:nvSpPr>
+                <p:cNvPr id="84" name="Oval 83">
+                  <a:extLst>
+                    <a:ext uri="{FF2B5EF4-FFF2-40B4-BE49-F238E27FC236}">
+                      <a16:creationId xmlns:a16="http://schemas.microsoft.com/office/drawing/2014/main" id="{37E40F5D-2FA5-4F28-9C5F-3E7261630111}"/>
+                    </a:ext>
+                  </a:extLst>
+                </p:cNvPr>
+                <p:cNvSpPr/>
+                <p:nvPr/>
+              </p:nvSpPr>
+              <p:spPr>
+                <a:xfrm>
+                  <a:off x="1122218" y="1753985"/>
+                  <a:ext cx="174567" cy="166255"/>
+                </a:xfrm>
+                <a:prstGeom prst="ellipse">
+                  <a:avLst/>
+                </a:prstGeom>
+                <a:solidFill>
+                  <a:schemeClr val="bg1"/>
+                </a:solidFill>
+                <a:ln>
+                  <a:solidFill>
+                    <a:srgbClr val="192857"/>
+                  </a:solidFill>
+                </a:ln>
+              </p:spPr>
+              <p:style>
+                <a:lnRef idx="2">
+                  <a:schemeClr val="accent1">
+                    <a:shade val="50000"/>
+                  </a:schemeClr>
+                </a:lnRef>
+                <a:fillRef idx="1">
+                  <a:schemeClr val="accent1"/>
+                </a:fillRef>
+                <a:effectRef idx="0">
+                  <a:schemeClr val="accent1"/>
+                </a:effectRef>
+                <a:fontRef idx="minor">
+                  <a:schemeClr val="lt1"/>
+                </a:fontRef>
+              </p:style>
+              <p:txBody>
+                <a:bodyPr rtlCol="0" anchor="ctr"/>
+                <a:lstStyle/>
+                <a:p>
+                  <a:pPr algn="ctr"/>
+                  <a:endParaRPr lang="en-US" dirty="0"/>
+                </a:p>
+              </p:txBody>
+            </p:sp>
+            <p:sp>
+              <p:nvSpPr>
+                <p:cNvPr id="85" name="Rectangle 84">
+                  <a:extLst>
+                    <a:ext uri="{FF2B5EF4-FFF2-40B4-BE49-F238E27FC236}">
+                      <a16:creationId xmlns:a16="http://schemas.microsoft.com/office/drawing/2014/main" id="{C2B0B61A-5C24-455B-A2F0-CE3E6E69EB01}"/>
+                    </a:ext>
+                  </a:extLst>
+                </p:cNvPr>
+                <p:cNvSpPr/>
+                <p:nvPr/>
+              </p:nvSpPr>
+              <p:spPr>
+                <a:xfrm rot="2802451">
+                  <a:off x="1063614" y="1870363"/>
+                  <a:ext cx="45719" cy="174567"/>
+                </a:xfrm>
+                <a:prstGeom prst="rect">
+                  <a:avLst/>
+                </a:prstGeom>
+                <a:solidFill>
+                  <a:srgbClr val="192857"/>
+                </a:solidFill>
+                <a:ln>
+                  <a:solidFill>
+                    <a:srgbClr val="192857"/>
+                  </a:solidFill>
+                </a:ln>
+              </p:spPr>
+              <p:style>
+                <a:lnRef idx="2">
+                  <a:schemeClr val="accent1">
+                    <a:shade val="50000"/>
+                  </a:schemeClr>
+                </a:lnRef>
+                <a:fillRef idx="1">
+                  <a:schemeClr val="accent1"/>
+                </a:fillRef>
+                <a:effectRef idx="0">
+                  <a:schemeClr val="accent1"/>
+                </a:effectRef>
+                <a:fontRef idx="minor">
+                  <a:schemeClr val="lt1"/>
+                </a:fontRef>
+              </p:style>
+              <p:txBody>
+                <a:bodyPr rtlCol="0" anchor="ctr"/>
+                <a:lstStyle/>
+                <a:p>
+                  <a:pPr algn="ctr"/>
+                  <a:endParaRPr lang="en-US"/>
+                </a:p>
+              </p:txBody>
+            </p:sp>
+          </p:grpSp>
+        </p:grpSp>
+        <p:sp>
+          <p:nvSpPr>
+            <p:cNvPr id="67" name="TextBox 66">
+              <a:extLst>
+                <a:ext uri="{FF2B5EF4-FFF2-40B4-BE49-F238E27FC236}">
+                  <a16:creationId xmlns:a16="http://schemas.microsoft.com/office/drawing/2014/main" id="{97E087FA-B28F-4C3E-AFE1-9E87E8970199}"/>
+                </a:ext>
+              </a:extLst>
+            </p:cNvPr>
+            <p:cNvSpPr txBox="1"/>
+            <p:nvPr/>
+          </p:nvSpPr>
+          <p:spPr>
+            <a:xfrm>
+              <a:off x="9205371" y="142265"/>
+              <a:ext cx="1676367" cy="307777"/>
+            </a:xfrm>
+            <a:prstGeom prst="rect">
+              <a:avLst/>
+            </a:prstGeom>
+            <a:noFill/>
+          </p:spPr>
+          <p:txBody>
+            <a:bodyPr wrap="square" rtlCol="0">
+              <a:spAutoFit/>
+            </a:bodyPr>
+            <a:lstStyle/>
+            <a:p>
+              <a:r>
+                <a:rPr lang="en-US" sz="1400" dirty="0">
+                  <a:solidFill>
+                    <a:srgbClr val="BFA458"/>
+                  </a:solidFill>
+                  <a:latin typeface="Arial Black" panose="020B0A04020102020204" pitchFamily="34" charset="0"/>
+                  <a:cs typeface="Aharoni" panose="02010803020104030203" pitchFamily="2" charset="-79"/>
+                </a:rPr>
+                <a:t>Username1234</a:t>
+              </a:r>
+            </a:p>
+          </p:txBody>
+        </p:sp>
+        <p:sp>
+          <p:nvSpPr>
+            <p:cNvPr id="68" name="TextBox 67">
+              <a:extLst>
+                <a:ext uri="{FF2B5EF4-FFF2-40B4-BE49-F238E27FC236}">
+                  <a16:creationId xmlns:a16="http://schemas.microsoft.com/office/drawing/2014/main" id="{E002804B-0779-4A3F-8F79-C5491D398772}"/>
+                </a:ext>
+              </a:extLst>
+            </p:cNvPr>
+            <p:cNvSpPr txBox="1"/>
+            <p:nvPr/>
+          </p:nvSpPr>
+          <p:spPr>
+            <a:xfrm>
+              <a:off x="832857" y="119877"/>
+              <a:ext cx="1004299" cy="369332"/>
+            </a:xfrm>
+            <a:prstGeom prst="rect">
+              <a:avLst/>
+            </a:prstGeom>
+            <a:noFill/>
+          </p:spPr>
+          <p:txBody>
+            <a:bodyPr wrap="square" rtlCol="0">
+              <a:spAutoFit/>
+            </a:bodyPr>
+            <a:lstStyle/>
+            <a:p>
+              <a:r>
+                <a:rPr lang="en-US" dirty="0">
+                  <a:solidFill>
+                    <a:srgbClr val="BFA458"/>
+                  </a:solidFill>
+                  <a:latin typeface="Arial Black" panose="020B0A04020102020204" pitchFamily="34" charset="0"/>
+                  <a:cs typeface="Aharoni" panose="02010803020104030203" pitchFamily="2" charset="-79"/>
+                </a:rPr>
+                <a:t>HOME</a:t>
+              </a:r>
+            </a:p>
+          </p:txBody>
+        </p:sp>
+        <p:pic>
+          <p:nvPicPr>
+            <p:cNvPr id="73" name="Graphic 72" descr="House">
+              <a:extLst>
+                <a:ext uri="{FF2B5EF4-FFF2-40B4-BE49-F238E27FC236}">
+                  <a16:creationId xmlns:a16="http://schemas.microsoft.com/office/drawing/2014/main" id="{6DD9A4A8-D881-4003-91D1-7D01E6EACE55}"/>
+                </a:ext>
+              </a:extLst>
+            </p:cNvPr>
+            <p:cNvPicPr>
+              <a:picLocks noChangeAspect="1"/>
+            </p:cNvPicPr>
+            <p:nvPr/>
+          </p:nvPicPr>
+          <p:blipFill>
+            <a:blip r:embed="rId4">
+              <a:extLst>
+                <a:ext uri="{28A0092B-C50C-407E-A947-70E740481C1C}">
+                  <a14:useLocalDpi xmlns:a14="http://schemas.microsoft.com/office/drawing/2010/main" val="0"/>
+                </a:ext>
+                <a:ext uri="{96DAC541-7B7A-43D3-8B79-37D633B846F1}">
+                  <asvg:svgBlip xmlns:asvg="http://schemas.microsoft.com/office/drawing/2016/SVG/main" r:embed="rId5"/>
+                </a:ext>
+              </a:extLst>
+            </a:blip>
+            <a:stretch>
+              <a:fillRect/>
+            </a:stretch>
+          </p:blipFill>
+          <p:spPr>
+            <a:xfrm>
+              <a:off x="444176" y="92087"/>
+              <a:ext cx="369332" cy="369332"/>
+            </a:xfrm>
+            <a:prstGeom prst="rect">
+              <a:avLst/>
+            </a:prstGeom>
+          </p:spPr>
+        </p:pic>
+        <p:sp>
+          <p:nvSpPr>
+            <p:cNvPr id="75" name="Rectangle 74">
+              <a:extLst>
+                <a:ext uri="{FF2B5EF4-FFF2-40B4-BE49-F238E27FC236}">
+                  <a16:creationId xmlns:a16="http://schemas.microsoft.com/office/drawing/2014/main" id="{AD9C01FE-14B5-4699-B987-077AF3EBAA88}"/>
+                </a:ext>
+              </a:extLst>
+            </p:cNvPr>
+            <p:cNvSpPr/>
+            <p:nvPr/>
+          </p:nvSpPr>
+          <p:spPr>
+            <a:xfrm>
+              <a:off x="340039" y="-5519"/>
+              <a:ext cx="1571179" cy="638665"/>
+            </a:xfrm>
+            <a:prstGeom prst="rect">
+              <a:avLst/>
+            </a:prstGeom>
+            <a:noFill/>
+            <a:ln w="25400">
+              <a:solidFill>
+                <a:srgbClr val="BFA458"/>
+              </a:solidFill>
+            </a:ln>
+          </p:spPr>
+          <p:style>
+            <a:lnRef idx="2">
+              <a:schemeClr val="accent1">
+                <a:shade val="50000"/>
+              </a:schemeClr>
+            </a:lnRef>
+            <a:fillRef idx="1">
+              <a:schemeClr val="accent1"/>
+            </a:fillRef>
+            <a:effectRef idx="0">
+              <a:schemeClr val="accent1"/>
+            </a:effectRef>
+            <a:fontRef idx="minor">
+              <a:schemeClr val="lt1"/>
+            </a:fontRef>
+          </p:style>
+          <p:txBody>
+            <a:bodyPr rtlCol="0" anchor="ctr"/>
+            <a:lstStyle/>
+            <a:p>
+              <a:pPr algn="ctr"/>
+              <a:endParaRPr lang="en-US"/>
+            </a:p>
+          </p:txBody>
+        </p:sp>
+        <p:sp>
+          <p:nvSpPr>
+            <p:cNvPr id="76" name="Rectangle 75">
+              <a:extLst>
+                <a:ext uri="{FF2B5EF4-FFF2-40B4-BE49-F238E27FC236}">
+                  <a16:creationId xmlns:a16="http://schemas.microsoft.com/office/drawing/2014/main" id="{C5E1A583-6431-4F83-BE8D-80D2DE36F26A}"/>
+                </a:ext>
+              </a:extLst>
+            </p:cNvPr>
+            <p:cNvSpPr/>
+            <p:nvPr/>
+          </p:nvSpPr>
+          <p:spPr>
+            <a:xfrm>
+              <a:off x="6006810" y="0"/>
+              <a:ext cx="1571179" cy="638665"/>
+            </a:xfrm>
+            <a:prstGeom prst="rect">
+              <a:avLst/>
+            </a:prstGeom>
+            <a:noFill/>
+            <a:ln w="25400">
+              <a:solidFill>
+                <a:srgbClr val="BFA458"/>
+              </a:solidFill>
+            </a:ln>
+          </p:spPr>
+          <p:style>
+            <a:lnRef idx="2">
+              <a:schemeClr val="accent1">
+                <a:shade val="50000"/>
+              </a:schemeClr>
+            </a:lnRef>
+            <a:fillRef idx="1">
+              <a:schemeClr val="accent1"/>
+            </a:fillRef>
+            <a:effectRef idx="0">
+              <a:schemeClr val="accent1"/>
+            </a:effectRef>
+            <a:fontRef idx="minor">
+              <a:schemeClr val="lt1"/>
+            </a:fontRef>
+          </p:style>
+          <p:txBody>
+            <a:bodyPr rtlCol="0" anchor="ctr"/>
+            <a:lstStyle/>
+            <a:p>
+              <a:pPr algn="ctr"/>
+              <a:endParaRPr lang="en-US"/>
+            </a:p>
+          </p:txBody>
+        </p:sp>
+        <p:sp>
+          <p:nvSpPr>
+            <p:cNvPr id="77" name="Rectangle 76">
+              <a:extLst>
+                <a:ext uri="{FF2B5EF4-FFF2-40B4-BE49-F238E27FC236}">
+                  <a16:creationId xmlns:a16="http://schemas.microsoft.com/office/drawing/2014/main" id="{3A6893FC-6897-4F16-B2F9-F252F69662DC}"/>
+                </a:ext>
+              </a:extLst>
+            </p:cNvPr>
+            <p:cNvSpPr/>
+            <p:nvPr/>
+          </p:nvSpPr>
+          <p:spPr>
+            <a:xfrm>
+              <a:off x="7584945" y="-3621"/>
+              <a:ext cx="1571179" cy="638665"/>
+            </a:xfrm>
+            <a:prstGeom prst="rect">
+              <a:avLst/>
+            </a:prstGeom>
+            <a:noFill/>
+            <a:ln w="25400">
+              <a:solidFill>
+                <a:srgbClr val="BFA458"/>
+              </a:solidFill>
+            </a:ln>
+          </p:spPr>
+          <p:style>
+            <a:lnRef idx="2">
+              <a:schemeClr val="accent1">
+                <a:shade val="50000"/>
+              </a:schemeClr>
+            </a:lnRef>
+            <a:fillRef idx="1">
+              <a:schemeClr val="accent1"/>
+            </a:fillRef>
+            <a:effectRef idx="0">
+              <a:schemeClr val="accent1"/>
+            </a:effectRef>
+            <a:fontRef idx="minor">
+              <a:schemeClr val="lt1"/>
+            </a:fontRef>
+          </p:style>
+          <p:txBody>
+            <a:bodyPr rtlCol="0" anchor="ctr"/>
+            <a:lstStyle/>
+            <a:p>
+              <a:pPr algn="ctr"/>
+              <a:endParaRPr lang="en-US"/>
+            </a:p>
+          </p:txBody>
+        </p:sp>
+        <p:sp>
+          <p:nvSpPr>
+            <p:cNvPr id="78" name="Rectangle 77">
+              <a:extLst>
+                <a:ext uri="{FF2B5EF4-FFF2-40B4-BE49-F238E27FC236}">
+                  <a16:creationId xmlns:a16="http://schemas.microsoft.com/office/drawing/2014/main" id="{20A021B9-1A4F-4449-B31F-4B3028DF1286}"/>
+                </a:ext>
+              </a:extLst>
+            </p:cNvPr>
+            <p:cNvSpPr/>
+            <p:nvPr/>
+          </p:nvSpPr>
+          <p:spPr>
+            <a:xfrm>
+              <a:off x="9163081" y="-694"/>
+              <a:ext cx="2155614" cy="638665"/>
+            </a:xfrm>
+            <a:prstGeom prst="rect">
+              <a:avLst/>
+            </a:prstGeom>
+            <a:noFill/>
+            <a:ln w="25400">
+              <a:solidFill>
+                <a:srgbClr val="BFA458"/>
+              </a:solidFill>
+            </a:ln>
+          </p:spPr>
+          <p:style>
+            <a:lnRef idx="2">
+              <a:schemeClr val="accent1">
+                <a:shade val="50000"/>
+              </a:schemeClr>
+            </a:lnRef>
+            <a:fillRef idx="1">
+              <a:schemeClr val="accent1"/>
+            </a:fillRef>
+            <a:effectRef idx="0">
+              <a:schemeClr val="accent1"/>
+            </a:effectRef>
+            <a:fontRef idx="minor">
+              <a:schemeClr val="lt1"/>
+            </a:fontRef>
+          </p:style>
+          <p:txBody>
+            <a:bodyPr rtlCol="0" anchor="ctr"/>
+            <a:lstStyle/>
+            <a:p>
+              <a:pPr algn="ctr"/>
+              <a:endParaRPr lang="en-US"/>
+            </a:p>
+          </p:txBody>
+        </p:sp>
+        <p:sp>
+          <p:nvSpPr>
+            <p:cNvPr id="79" name="Isosceles Triangle 78">
+              <a:extLst>
+                <a:ext uri="{FF2B5EF4-FFF2-40B4-BE49-F238E27FC236}">
+                  <a16:creationId xmlns:a16="http://schemas.microsoft.com/office/drawing/2014/main" id="{A5B3C150-CC5E-45CC-AA5B-5D84893A246F}"/>
+                </a:ext>
+              </a:extLst>
+            </p:cNvPr>
+            <p:cNvSpPr/>
+            <p:nvPr/>
+          </p:nvSpPr>
+          <p:spPr>
+            <a:xfrm rot="10800000">
+              <a:off x="10926506" y="201708"/>
+              <a:ext cx="261256" cy="211142"/>
+            </a:xfrm>
+            <a:prstGeom prst="triangle">
+              <a:avLst/>
+            </a:prstGeom>
+            <a:solidFill>
+              <a:srgbClr val="BFA458"/>
+            </a:solidFill>
+            <a:ln>
+              <a:solidFill>
+                <a:srgbClr val="192857"/>
+              </a:solidFill>
+            </a:ln>
+          </p:spPr>
+          <p:style>
+            <a:lnRef idx="2">
+              <a:schemeClr val="accent1">
+                <a:shade val="50000"/>
+              </a:schemeClr>
+            </a:lnRef>
+            <a:fillRef idx="1">
+              <a:schemeClr val="accent1"/>
+            </a:fillRef>
+            <a:effectRef idx="0">
+              <a:schemeClr val="accent1"/>
+            </a:effectRef>
+            <a:fontRef idx="minor">
+              <a:schemeClr val="lt1"/>
+            </a:fontRef>
+          </p:style>
+          <p:txBody>
+            <a:bodyPr rtlCol="0" anchor="ctr"/>
+            <a:lstStyle/>
+            <a:p>
+              <a:pPr algn="ctr"/>
+              <a:endParaRPr lang="en-US"/>
+            </a:p>
+          </p:txBody>
+        </p:sp>
+        <p:sp>
+          <p:nvSpPr>
+            <p:cNvPr id="80" name="TextBox 79">
+              <a:extLst>
+                <a:ext uri="{FF2B5EF4-FFF2-40B4-BE49-F238E27FC236}">
+                  <a16:creationId xmlns:a16="http://schemas.microsoft.com/office/drawing/2014/main" id="{37D6B31F-0509-4274-B546-DAD964052312}"/>
+                </a:ext>
+              </a:extLst>
+            </p:cNvPr>
+            <p:cNvSpPr txBox="1"/>
+            <p:nvPr/>
+          </p:nvSpPr>
+          <p:spPr>
+            <a:xfrm>
+              <a:off x="6107843" y="39139"/>
+              <a:ext cx="1298402" cy="584775"/>
+            </a:xfrm>
+            <a:prstGeom prst="rect">
+              <a:avLst/>
+            </a:prstGeom>
+            <a:noFill/>
+          </p:spPr>
+          <p:txBody>
+            <a:bodyPr wrap="square" rtlCol="0">
+              <a:spAutoFit/>
+            </a:bodyPr>
+            <a:lstStyle/>
+            <a:p>
+              <a:pPr algn="ctr"/>
+              <a:r>
+                <a:rPr lang="en-US" sz="1600" dirty="0">
+                  <a:solidFill>
+                    <a:srgbClr val="BFA458"/>
+                  </a:solidFill>
+                  <a:latin typeface="Arial Black" panose="020B0A04020102020204" pitchFamily="34" charset="0"/>
+                  <a:cs typeface="Aharoni" panose="02010803020104030203" pitchFamily="2" charset="-79"/>
+                </a:rPr>
+                <a:t>Filter </a:t>
+              </a:r>
+            </a:p>
+            <a:p>
+              <a:pPr algn="ctr"/>
+              <a:r>
+                <a:rPr lang="en-US" sz="1600" dirty="0">
+                  <a:solidFill>
+                    <a:srgbClr val="BFA458"/>
+                  </a:solidFill>
+                  <a:latin typeface="Arial Black" panose="020B0A04020102020204" pitchFamily="34" charset="0"/>
+                  <a:cs typeface="Aharoni" panose="02010803020104030203" pitchFamily="2" charset="-79"/>
+                </a:rPr>
+                <a:t>Search</a:t>
+              </a:r>
+            </a:p>
+          </p:txBody>
+        </p:sp>
+        <p:sp>
+          <p:nvSpPr>
+            <p:cNvPr id="81" name="TextBox 80">
+              <a:extLst>
+                <a:ext uri="{FF2B5EF4-FFF2-40B4-BE49-F238E27FC236}">
+                  <a16:creationId xmlns:a16="http://schemas.microsoft.com/office/drawing/2014/main" id="{FDFE39D3-4C81-4F99-A5DB-4EC383E1DDD1}"/>
+                </a:ext>
+              </a:extLst>
+            </p:cNvPr>
+            <p:cNvSpPr txBox="1"/>
+            <p:nvPr/>
+          </p:nvSpPr>
+          <p:spPr>
+            <a:xfrm>
+              <a:off x="7546460" y="45024"/>
+              <a:ext cx="1508289" cy="584775"/>
+            </a:xfrm>
+            <a:prstGeom prst="rect">
+              <a:avLst/>
+            </a:prstGeom>
+            <a:noFill/>
+          </p:spPr>
+          <p:txBody>
+            <a:bodyPr wrap="square" rtlCol="0">
+              <a:spAutoFit/>
+            </a:bodyPr>
+            <a:lstStyle/>
+            <a:p>
+              <a:pPr algn="ctr"/>
+              <a:r>
+                <a:rPr lang="en-US" sz="1600" dirty="0">
+                  <a:solidFill>
+                    <a:srgbClr val="BFA458"/>
+                  </a:solidFill>
+                  <a:latin typeface="Arial Black" panose="020B0A04020102020204" pitchFamily="34" charset="0"/>
+                  <a:cs typeface="Aharoni" panose="02010803020104030203" pitchFamily="2" charset="-79"/>
+                </a:rPr>
+                <a:t>Create Posting</a:t>
+              </a:r>
+            </a:p>
+          </p:txBody>
+        </p:sp>
+      </p:grpSp>
+      <p:grpSp>
+        <p:nvGrpSpPr>
+          <p:cNvPr id="4" name="Group 3">
+            <a:extLst>
+              <a:ext uri="{FF2B5EF4-FFF2-40B4-BE49-F238E27FC236}">
+                <a16:creationId xmlns:a16="http://schemas.microsoft.com/office/drawing/2014/main" id="{98A2F0E2-6B23-4631-906D-7E30C4385CAC}"/>
+              </a:ext>
+            </a:extLst>
+          </p:cNvPr>
+          <p:cNvGrpSpPr/>
+          <p:nvPr/>
+        </p:nvGrpSpPr>
+        <p:grpSpPr>
+          <a:xfrm>
+            <a:off x="11808505" y="886406"/>
+            <a:ext cx="182879" cy="5943600"/>
+            <a:chOff x="11808505" y="886406"/>
+            <a:chExt cx="182879" cy="5943600"/>
+          </a:xfrm>
+        </p:grpSpPr>
+        <p:sp>
+          <p:nvSpPr>
+            <p:cNvPr id="2" name="Rectangle 1">
+              <a:extLst>
+                <a:ext uri="{FF2B5EF4-FFF2-40B4-BE49-F238E27FC236}">
+                  <a16:creationId xmlns:a16="http://schemas.microsoft.com/office/drawing/2014/main" id="{59A09653-F030-4AAC-BCDA-5310CE1208C1}"/>
+                </a:ext>
+              </a:extLst>
+            </p:cNvPr>
+            <p:cNvSpPr/>
+            <p:nvPr/>
+          </p:nvSpPr>
+          <p:spPr>
+            <a:xfrm>
+              <a:off x="11808505" y="886406"/>
+              <a:ext cx="182879" cy="5943600"/>
+            </a:xfrm>
+            <a:prstGeom prst="rect">
+              <a:avLst/>
+            </a:prstGeom>
+            <a:solidFill>
+              <a:srgbClr val="E7E6E6"/>
+            </a:solidFill>
+            <a:ln w="25400">
+              <a:solidFill>
+                <a:srgbClr val="192857"/>
+              </a:solidFill>
+            </a:ln>
+          </p:spPr>
+          <p:style>
+            <a:lnRef idx="2">
+              <a:schemeClr val="accent1">
+                <a:shade val="50000"/>
+              </a:schemeClr>
+            </a:lnRef>
+            <a:fillRef idx="1">
+              <a:schemeClr val="accent1"/>
+            </a:fillRef>
+            <a:effectRef idx="0">
+              <a:schemeClr val="accent1"/>
+            </a:effectRef>
+            <a:fontRef idx="minor">
+              <a:schemeClr val="lt1"/>
+            </a:fontRef>
+          </p:style>
+          <p:txBody>
+            <a:bodyPr rtlCol="0" anchor="ctr"/>
+            <a:lstStyle/>
+            <a:p>
+              <a:pPr algn="ctr"/>
+              <a:endParaRPr lang="en-US"/>
+            </a:p>
+          </p:txBody>
+        </p:sp>
+        <p:sp>
+          <p:nvSpPr>
+            <p:cNvPr id="3" name="Rectangle 2">
+              <a:extLst>
+                <a:ext uri="{FF2B5EF4-FFF2-40B4-BE49-F238E27FC236}">
+                  <a16:creationId xmlns:a16="http://schemas.microsoft.com/office/drawing/2014/main" id="{8C8BA173-9149-42B2-8326-1C10ACC9CC6C}"/>
+                </a:ext>
+              </a:extLst>
+            </p:cNvPr>
+            <p:cNvSpPr/>
+            <p:nvPr/>
+          </p:nvSpPr>
+          <p:spPr>
+            <a:xfrm>
+              <a:off x="11827171" y="905070"/>
+              <a:ext cx="146304" cy="3402727"/>
+            </a:xfrm>
+            <a:prstGeom prst="rect">
+              <a:avLst/>
+            </a:prstGeom>
+            <a:solidFill>
+              <a:srgbClr val="BFA458"/>
+            </a:solidFill>
+            <a:ln>
+              <a:solidFill>
+                <a:srgbClr val="BFA458"/>
+              </a:solidFill>
+            </a:ln>
+          </p:spPr>
+          <p:style>
+            <a:lnRef idx="2">
+              <a:schemeClr val="accent1">
+                <a:shade val="50000"/>
+              </a:schemeClr>
+            </a:lnRef>
+            <a:fillRef idx="1">
+              <a:schemeClr val="accent1"/>
+            </a:fillRef>
+            <a:effectRef idx="0">
+              <a:schemeClr val="accent1"/>
+            </a:effectRef>
+            <a:fontRef idx="minor">
+              <a:schemeClr val="lt1"/>
+            </a:fontRef>
+          </p:style>
+          <p:txBody>
+            <a:bodyPr rtlCol="0" anchor="ctr"/>
+            <a:lstStyle/>
+            <a:p>
+              <a:pPr algn="ctr"/>
+              <a:endParaRPr lang="en-US"/>
+            </a:p>
+          </p:txBody>
+        </p:sp>
+      </p:grpSp>
     </p:spTree>
     <p:extLst>
       <p:ext uri="{BB962C8B-B14F-4D97-AF65-F5344CB8AC3E}">

</xml_diff>

<commit_message>
moved second slide box over left
</commit_message>
<xml_diff>
--- a/documentation/Mockups/powerpoint-pdf-mocks/mock-views.pptx
+++ b/documentation/Mockups/powerpoint-pdf-mocks/mock-views.pptx
@@ -6811,7 +6811,7 @@
         </p:nvSpPr>
         <p:spPr>
           <a:xfrm>
-            <a:off x="355498" y="868681"/>
+            <a:off x="288994" y="868681"/>
             <a:ext cx="11658600" cy="5989319"/>
           </a:xfrm>
           <a:prstGeom prst="rect">
@@ -6963,7 +6963,7 @@
         </p:nvSpPr>
         <p:spPr>
           <a:xfrm>
-            <a:off x="3103250" y="1054444"/>
+            <a:off x="3036746" y="1054444"/>
             <a:ext cx="5486400" cy="461665"/>
           </a:xfrm>
           <a:prstGeom prst="rect">
@@ -7000,7 +7000,7 @@
         </p:nvSpPr>
         <p:spPr>
           <a:xfrm>
-            <a:off x="543982" y="2635166"/>
+            <a:off x="477478" y="2635166"/>
             <a:ext cx="4740362" cy="338554"/>
           </a:xfrm>
           <a:prstGeom prst="rect">
@@ -7037,7 +7037,7 @@
         </p:nvSpPr>
         <p:spPr>
           <a:xfrm>
-            <a:off x="543982" y="3592064"/>
+            <a:off x="477478" y="3592064"/>
             <a:ext cx="4740362" cy="338554"/>
           </a:xfrm>
           <a:prstGeom prst="rect">
@@ -7074,7 +7074,7 @@
         </p:nvSpPr>
         <p:spPr>
           <a:xfrm>
-            <a:off x="6096000" y="1679133"/>
+            <a:off x="6029496" y="1679133"/>
             <a:ext cx="4740362" cy="338554"/>
           </a:xfrm>
           <a:prstGeom prst="rect">
@@ -7111,7 +7111,7 @@
         </p:nvSpPr>
         <p:spPr>
           <a:xfrm>
-            <a:off x="543983" y="5160151"/>
+            <a:off x="477479" y="5160151"/>
             <a:ext cx="2241788" cy="338554"/>
           </a:xfrm>
           <a:prstGeom prst="rect">
@@ -7148,7 +7148,7 @@
         </p:nvSpPr>
         <p:spPr>
           <a:xfrm>
-            <a:off x="6204856" y="2180712"/>
+            <a:off x="6138352" y="2180712"/>
             <a:ext cx="5385787" cy="3317994"/>
           </a:xfrm>
           <a:prstGeom prst="rect">
@@ -7201,7 +7201,7 @@
         </p:nvSpPr>
         <p:spPr>
           <a:xfrm>
-            <a:off x="543982" y="5720679"/>
+            <a:off x="477478" y="5720679"/>
             <a:ext cx="5354986" cy="338554"/>
           </a:xfrm>
           <a:prstGeom prst="rect">
@@ -7238,7 +7238,7 @@
         </p:nvGrpSpPr>
         <p:grpSpPr>
           <a:xfrm>
-            <a:off x="601357" y="3071226"/>
+            <a:off x="534853" y="3071226"/>
             <a:ext cx="4007966" cy="338554"/>
             <a:chOff x="601356" y="2035795"/>
             <a:chExt cx="4007966" cy="338554"/>
@@ -7379,7 +7379,7 @@
         </p:nvSpPr>
         <p:spPr>
           <a:xfrm>
-            <a:off x="543982" y="1671155"/>
+            <a:off x="477478" y="1671155"/>
             <a:ext cx="4740362" cy="338554"/>
           </a:xfrm>
           <a:prstGeom prst="rect">
@@ -7416,7 +7416,7 @@
         </p:nvSpPr>
         <p:spPr>
           <a:xfrm>
-            <a:off x="601356" y="2096676"/>
+            <a:off x="534852" y="2096676"/>
             <a:ext cx="4007966" cy="338554"/>
           </a:xfrm>
           <a:prstGeom prst="rect">
@@ -7481,7 +7481,7 @@
         </p:nvSpPr>
         <p:spPr>
           <a:xfrm>
-            <a:off x="702100" y="3958874"/>
+            <a:off x="635596" y="3958874"/>
             <a:ext cx="145580" cy="123409"/>
           </a:xfrm>
           <a:prstGeom prst="ellipse">
@@ -7535,7 +7535,7 @@
         </p:nvSpPr>
         <p:spPr>
           <a:xfrm>
-            <a:off x="702100" y="4307798"/>
+            <a:off x="635596" y="4307798"/>
             <a:ext cx="156316" cy="142526"/>
           </a:xfrm>
           <a:prstGeom prst="ellipse">
@@ -7589,7 +7589,7 @@
         </p:nvSpPr>
         <p:spPr>
           <a:xfrm>
-            <a:off x="711431" y="4677551"/>
+            <a:off x="644927" y="4677551"/>
             <a:ext cx="156316" cy="142526"/>
           </a:xfrm>
           <a:prstGeom prst="ellipse">
@@ -7643,7 +7643,7 @@
         </p:nvSpPr>
         <p:spPr>
           <a:xfrm>
-            <a:off x="905859" y="3867220"/>
+            <a:off x="839355" y="3867220"/>
             <a:ext cx="2724539" cy="307777"/>
           </a:xfrm>
           <a:prstGeom prst="rect">
@@ -7681,7 +7681,7 @@
         </p:nvSpPr>
         <p:spPr>
           <a:xfrm>
-            <a:off x="905859" y="4230719"/>
+            <a:off x="839355" y="4230719"/>
             <a:ext cx="2724539" cy="307777"/>
           </a:xfrm>
           <a:prstGeom prst="rect">
@@ -7719,7 +7719,7 @@
         </p:nvSpPr>
         <p:spPr>
           <a:xfrm>
-            <a:off x="905858" y="4587039"/>
+            <a:off x="839354" y="4587039"/>
             <a:ext cx="2724539" cy="307777"/>
           </a:xfrm>
           <a:prstGeom prst="rect">
@@ -7757,7 +7757,7 @@
         </p:nvSpPr>
         <p:spPr>
           <a:xfrm>
-            <a:off x="3321698" y="5141807"/>
+            <a:off x="3255194" y="5141807"/>
             <a:ext cx="1287624" cy="391479"/>
           </a:xfrm>
           <a:prstGeom prst="rect">
@@ -7818,7 +7818,7 @@
         </p:nvSpPr>
         <p:spPr>
           <a:xfrm>
-            <a:off x="780258" y="6128928"/>
+            <a:off x="713754" y="6128928"/>
             <a:ext cx="188468" cy="195739"/>
           </a:xfrm>
           <a:prstGeom prst="rect">
@@ -7872,7 +7872,7 @@
         </p:nvSpPr>
         <p:spPr>
           <a:xfrm>
-            <a:off x="780258" y="6522299"/>
+            <a:off x="713754" y="6522299"/>
             <a:ext cx="188468" cy="195739"/>
           </a:xfrm>
           <a:prstGeom prst="rect">
@@ -7926,7 +7926,7 @@
         </p:nvSpPr>
         <p:spPr>
           <a:xfrm>
-            <a:off x="1271349" y="6059233"/>
+            <a:off x="1204845" y="6059233"/>
             <a:ext cx="2724539" cy="307777"/>
           </a:xfrm>
           <a:prstGeom prst="rect">
@@ -7981,7 +7981,7 @@
         </p:blipFill>
         <p:spPr>
           <a:xfrm>
-            <a:off x="788319" y="6139022"/>
+            <a:off x="721815" y="6139022"/>
             <a:ext cx="195739" cy="195739"/>
           </a:xfrm>
           <a:prstGeom prst="rect">
@@ -8003,7 +8003,7 @@
         </p:nvSpPr>
         <p:spPr>
           <a:xfrm>
-            <a:off x="1271349" y="6436698"/>
+            <a:off x="1204845" y="6436698"/>
             <a:ext cx="2724539" cy="307777"/>
           </a:xfrm>
           <a:prstGeom prst="rect">
@@ -8041,7 +8041,7 @@
         </p:nvSpPr>
         <p:spPr>
           <a:xfrm>
-            <a:off x="6096000" y="5816914"/>
+            <a:off x="6029496" y="5816914"/>
             <a:ext cx="4740362" cy="338554"/>
           </a:xfrm>
           <a:prstGeom prst="rect">
@@ -8078,7 +8078,7 @@
         </p:nvSpPr>
         <p:spPr>
           <a:xfrm>
-            <a:off x="6204856" y="6318493"/>
+            <a:off x="6138352" y="6318493"/>
             <a:ext cx="5385787" cy="539507"/>
           </a:xfrm>
           <a:prstGeom prst="rect">
@@ -8132,7 +8132,7 @@
         </p:nvSpPr>
         <p:spPr>
           <a:xfrm>
-            <a:off x="9652760" y="4243757"/>
+            <a:off x="9586256" y="4243757"/>
             <a:ext cx="1553113" cy="954107"/>
           </a:xfrm>
           <a:prstGeom prst="rect">
@@ -9033,7 +9033,7 @@
         </p:nvGrpSpPr>
         <p:grpSpPr>
           <a:xfrm>
-            <a:off x="11808505" y="886406"/>
+            <a:off x="11742001" y="886406"/>
             <a:ext cx="182879" cy="5943600"/>
             <a:chOff x="11808505" y="886406"/>
             <a:chExt cx="182879" cy="5943600"/>

</xml_diff>